<commit_message>
UML bilder einfügen (update)
</commit_message>
<xml_diff>
--- a/documentation/presentations/PRSE_SS22-Team2_Sprint_2_Presentation.pptx
+++ b/documentation/presentations/PRSE_SS22-Team2_Sprint_2_Presentation.pptx
@@ -5,24 +5,28 @@
     <p:sldMasterId id="2147483648" r:id="rId1"/>
   </p:sldMasterIdLst>
   <p:notesMasterIdLst>
-    <p:notesMasterId r:id="rId10"/>
+    <p:notesMasterId r:id="rId14"/>
   </p:notesMasterIdLst>
   <p:sldIdLst>
     <p:sldId id="256" r:id="rId2"/>
-    <p:sldId id="258" r:id="rId3"/>
-    <p:sldId id="263" r:id="rId4"/>
-    <p:sldId id="264" r:id="rId5"/>
-    <p:sldId id="260" r:id="rId6"/>
-    <p:sldId id="265" r:id="rId7"/>
-    <p:sldId id="261" r:id="rId8"/>
-    <p:sldId id="262" r:id="rId9"/>
+    <p:sldId id="266" r:id="rId3"/>
+    <p:sldId id="258" r:id="rId4"/>
+    <p:sldId id="267" r:id="rId5"/>
+    <p:sldId id="268" r:id="rId6"/>
+    <p:sldId id="269" r:id="rId7"/>
+    <p:sldId id="263" r:id="rId8"/>
+    <p:sldId id="264" r:id="rId9"/>
+    <p:sldId id="260" r:id="rId10"/>
+    <p:sldId id="265" r:id="rId11"/>
+    <p:sldId id="261" r:id="rId12"/>
+    <p:sldId id="262" r:id="rId13"/>
   </p:sldIdLst>
   <p:sldSz cx="9144000" cy="6858000" type="screen4x3"/>
   <p:notesSz cx="7102475" cy="10234613"/>
   <p:embeddedFontLst>
     <p:embeddedFont>
       <p:font typeface="Arial Black" panose="020B0A04020102020204" pitchFamily="34" charset="0"/>
-      <p:bold r:id="rId11"/>
+      <p:bold r:id="rId15"/>
     </p:embeddedFont>
   </p:embeddedFontLst>
   <p:defaultTextStyle>
@@ -270,7 +274,7 @@
       </p15:sldGuideLst>
     </p:ext>
     <p:ext uri="http://customooxmlschemas.google.com/">
-      <go:slidesCustomData xmlns:go="http://customooxmlschemas.google.com/" xmlns:p15="http://schemas.microsoft.com/office/powerpoint/2012/main" xmlns:p14="http://schemas.microsoft.com/office/powerpoint/2010/main" xmlns:com="http://schemas.openxmlformats.org/drawingml/2006/compatibility" xmlns:pvml="urn:schemas-microsoft-com:office:powerpoint" xmlns:v="urn:schemas-microsoft-com:vml" xmlns:o="urn:schemas-microsoft-com:office:office" xmlns:dgm="http://schemas.openxmlformats.org/drawingml/2006/diagram" xmlns:c="http://schemas.openxmlformats.org/drawingml/2006/chart" xmlns:mv="urn:schemas-microsoft-com:mac:vml" xmlns:mc="http://schemas.openxmlformats.org/markup-compatibility/2006" xmlns="" r:id="rId13" roundtripDataSignature="AMtx7mhaA5WXhyXkxY3REEG0V10yJknC+Q=="/>
+      <go:slidesCustomData xmlns="" xmlns:mc="http://schemas.openxmlformats.org/markup-compatibility/2006" xmlns:mv="urn:schemas-microsoft-com:mac:vml" xmlns:c="http://schemas.openxmlformats.org/drawingml/2006/chart" xmlns:dgm="http://schemas.openxmlformats.org/drawingml/2006/diagram" xmlns:o="urn:schemas-microsoft-com:office:office" xmlns:v="urn:schemas-microsoft-com:vml" xmlns:pvml="urn:schemas-microsoft-com:office:powerpoint" xmlns:com="http://schemas.openxmlformats.org/drawingml/2006/compatibility" xmlns:p14="http://schemas.microsoft.com/office/powerpoint/2010/main" xmlns:p15="http://schemas.microsoft.com/office/powerpoint/2012/main" xmlns:go="http://customooxmlschemas.google.com/" r:id="rId16" roundtripDataSignature="AMtx7mhaA5WXhyXkxY3REEG0V10yJknC+Q=="/>
     </p:ext>
   </p:extLst>
 </p:presentation>
@@ -1624,6 +1628,449 @@
 </p:notes>
 </file>
 
+<file path=ppt/notesSlides/notesSlide10.xml><?xml version="1.0" encoding="utf-8"?>
+<p:notes xmlns:a="http://schemas.openxmlformats.org/drawingml/2006/main" xmlns:r="http://schemas.openxmlformats.org/officeDocument/2006/relationships" xmlns:p="http://schemas.openxmlformats.org/presentationml/2006/main" showMasterSp="0" showMasterPhAnim="0">
+  <p:cSld>
+    <p:spTree>
+      <p:nvGrpSpPr>
+        <p:cNvPr id="1" name="Shape 176"/>
+        <p:cNvGrpSpPr/>
+        <p:nvPr/>
+      </p:nvGrpSpPr>
+      <p:grpSpPr>
+        <a:xfrm>
+          <a:off x="0" y="0"/>
+          <a:ext cx="0" cy="0"/>
+          <a:chOff x="0" y="0"/>
+          <a:chExt cx="0" cy="0"/>
+        </a:xfrm>
+      </p:grpSpPr>
+      <p:sp>
+        <p:nvSpPr>
+          <p:cNvPr id="177" name="Google Shape;177;g71d64f1754_0_16:notes"/>
+          <p:cNvSpPr>
+            <a:spLocks noGrp="1" noRot="1" noChangeAspect="1"/>
+          </p:cNvSpPr>
+          <p:nvPr>
+            <p:ph type="sldImg" idx="2"/>
+          </p:nvPr>
+        </p:nvSpPr>
+        <p:spPr>
+          <a:xfrm>
+            <a:off x="1247775" y="1279525"/>
+            <a:ext cx="4606925" cy="3454400"/>
+          </a:xfrm>
+          <a:custGeom>
+            <a:avLst/>
+            <a:gdLst/>
+            <a:ahLst/>
+            <a:cxnLst/>
+            <a:rect l="l" t="t" r="r" b="b"/>
+            <a:pathLst>
+              <a:path w="120000" h="120000" extrusionOk="0">
+                <a:moveTo>
+                  <a:pt x="0" y="0"/>
+                </a:moveTo>
+                <a:lnTo>
+                  <a:pt x="120000" y="0"/>
+                </a:lnTo>
+                <a:lnTo>
+                  <a:pt x="120000" y="120000"/>
+                </a:lnTo>
+                <a:lnTo>
+                  <a:pt x="0" y="120000"/>
+                </a:lnTo>
+                <a:close/>
+              </a:path>
+            </a:pathLst>
+          </a:custGeom>
+        </p:spPr>
+      </p:sp>
+      <p:sp>
+        <p:nvSpPr>
+          <p:cNvPr id="178" name="Google Shape;178;g71d64f1754_0_16:notes"/>
+          <p:cNvSpPr txBox="1">
+            <a:spLocks noGrp="1"/>
+          </p:cNvSpPr>
+          <p:nvPr>
+            <p:ph type="body" idx="1"/>
+          </p:nvPr>
+        </p:nvSpPr>
+        <p:spPr>
+          <a:xfrm>
+            <a:off x="709613" y="4926013"/>
+            <a:ext cx="5683200" cy="4029000"/>
+          </a:xfrm>
+          <a:prstGeom prst="rect">
+            <a:avLst/>
+          </a:prstGeom>
+        </p:spPr>
+        <p:txBody>
+          <a:bodyPr spcFirstLastPara="1" wrap="square" lIns="91425" tIns="45700" rIns="91425" bIns="45700" anchor="t" anchorCtr="0">
+            <a:noAutofit/>
+          </a:bodyPr>
+          <a:lstStyle/>
+          <a:p>
+            <a:pPr marL="0" lvl="0" indent="0" algn="l" rtl="0">
+              <a:spcBef>
+                <a:spcPts val="0"/>
+              </a:spcBef>
+              <a:spcAft>
+                <a:spcPts val="0"/>
+              </a:spcAft>
+              <a:buNone/>
+            </a:pPr>
+            <a:endParaRPr/>
+          </a:p>
+        </p:txBody>
+      </p:sp>
+      <p:sp>
+        <p:nvSpPr>
+          <p:cNvPr id="179" name="Google Shape;179;g71d64f1754_0_16:notes"/>
+          <p:cNvSpPr txBox="1">
+            <a:spLocks noGrp="1"/>
+          </p:cNvSpPr>
+          <p:nvPr>
+            <p:ph type="sldNum" idx="12"/>
+          </p:nvPr>
+        </p:nvSpPr>
+        <p:spPr>
+          <a:xfrm>
+            <a:off x="4022725" y="9721850"/>
+            <a:ext cx="3078300" cy="512700"/>
+          </a:xfrm>
+          <a:prstGeom prst="rect">
+            <a:avLst/>
+          </a:prstGeom>
+        </p:spPr>
+        <p:txBody>
+          <a:bodyPr spcFirstLastPara="1" wrap="square" lIns="91425" tIns="45700" rIns="91425" bIns="45700" anchor="b" anchorCtr="0">
+            <a:noAutofit/>
+          </a:bodyPr>
+          <a:lstStyle/>
+          <a:p>
+            <a:pPr marL="0" lvl="0" indent="0" algn="r" rtl="0">
+              <a:spcBef>
+                <a:spcPts val="0"/>
+              </a:spcBef>
+              <a:spcAft>
+                <a:spcPts val="0"/>
+              </a:spcAft>
+              <a:buNone/>
+            </a:pPr>
+            <a:fld id="{00000000-1234-1234-1234-123412341234}" type="slidenum">
+              <a:rPr lang="de-AT"/>
+              <a:t>10</a:t>
+            </a:fld>
+            <a:endParaRPr/>
+          </a:p>
+        </p:txBody>
+      </p:sp>
+    </p:spTree>
+    <p:extLst>
+      <p:ext uri="{BB962C8B-B14F-4D97-AF65-F5344CB8AC3E}">
+        <p14:creationId xmlns:p14="http://schemas.microsoft.com/office/powerpoint/2010/main" val="3347095781"/>
+      </p:ext>
+    </p:extLst>
+  </p:cSld>
+  <p:clrMapOvr>
+    <a:masterClrMapping/>
+  </p:clrMapOvr>
+</p:notes>
+</file>
+
+<file path=ppt/notesSlides/notesSlide11.xml><?xml version="1.0" encoding="utf-8"?>
+<p:notes xmlns:a="http://schemas.openxmlformats.org/drawingml/2006/main" xmlns:r="http://schemas.openxmlformats.org/officeDocument/2006/relationships" xmlns:p="http://schemas.openxmlformats.org/presentationml/2006/main" showMasterSp="0" showMasterPhAnim="0">
+  <p:cSld>
+    <p:spTree>
+      <p:nvGrpSpPr>
+        <p:cNvPr id="1" name="Shape 186"/>
+        <p:cNvGrpSpPr/>
+        <p:nvPr/>
+      </p:nvGrpSpPr>
+      <p:grpSpPr>
+        <a:xfrm>
+          <a:off x="0" y="0"/>
+          <a:ext cx="0" cy="0"/>
+          <a:chOff x="0" y="0"/>
+          <a:chExt cx="0" cy="0"/>
+        </a:xfrm>
+      </p:grpSpPr>
+      <p:sp>
+        <p:nvSpPr>
+          <p:cNvPr id="187" name="Google Shape;187;g71d64f1754_0_25:notes"/>
+          <p:cNvSpPr>
+            <a:spLocks noGrp="1" noRot="1" noChangeAspect="1"/>
+          </p:cNvSpPr>
+          <p:nvPr>
+            <p:ph type="sldImg" idx="2"/>
+          </p:nvPr>
+        </p:nvSpPr>
+        <p:spPr>
+          <a:xfrm>
+            <a:off x="1247775" y="1279525"/>
+            <a:ext cx="4606925" cy="3454400"/>
+          </a:xfrm>
+          <a:custGeom>
+            <a:avLst/>
+            <a:gdLst/>
+            <a:ahLst/>
+            <a:cxnLst/>
+            <a:rect l="l" t="t" r="r" b="b"/>
+            <a:pathLst>
+              <a:path w="120000" h="120000" extrusionOk="0">
+                <a:moveTo>
+                  <a:pt x="0" y="0"/>
+                </a:moveTo>
+                <a:lnTo>
+                  <a:pt x="120000" y="0"/>
+                </a:lnTo>
+                <a:lnTo>
+                  <a:pt x="120000" y="120000"/>
+                </a:lnTo>
+                <a:lnTo>
+                  <a:pt x="0" y="120000"/>
+                </a:lnTo>
+                <a:close/>
+              </a:path>
+            </a:pathLst>
+          </a:custGeom>
+        </p:spPr>
+      </p:sp>
+      <p:sp>
+        <p:nvSpPr>
+          <p:cNvPr id="188" name="Google Shape;188;g71d64f1754_0_25:notes"/>
+          <p:cNvSpPr txBox="1">
+            <a:spLocks noGrp="1"/>
+          </p:cNvSpPr>
+          <p:nvPr>
+            <p:ph type="body" idx="1"/>
+          </p:nvPr>
+        </p:nvSpPr>
+        <p:spPr>
+          <a:xfrm>
+            <a:off x="709613" y="4926013"/>
+            <a:ext cx="5683200" cy="4029000"/>
+          </a:xfrm>
+          <a:prstGeom prst="rect">
+            <a:avLst/>
+          </a:prstGeom>
+        </p:spPr>
+        <p:txBody>
+          <a:bodyPr spcFirstLastPara="1" wrap="square" lIns="91425" tIns="45700" rIns="91425" bIns="45700" anchor="t" anchorCtr="0">
+            <a:noAutofit/>
+          </a:bodyPr>
+          <a:lstStyle/>
+          <a:p>
+            <a:pPr marL="0" lvl="0" indent="0" algn="l" rtl="0">
+              <a:spcBef>
+                <a:spcPts val="0"/>
+              </a:spcBef>
+              <a:spcAft>
+                <a:spcPts val="0"/>
+              </a:spcAft>
+              <a:buNone/>
+            </a:pPr>
+            <a:endParaRPr/>
+          </a:p>
+        </p:txBody>
+      </p:sp>
+      <p:sp>
+        <p:nvSpPr>
+          <p:cNvPr id="189" name="Google Shape;189;g71d64f1754_0_25:notes"/>
+          <p:cNvSpPr txBox="1">
+            <a:spLocks noGrp="1"/>
+          </p:cNvSpPr>
+          <p:nvPr>
+            <p:ph type="sldNum" idx="12"/>
+          </p:nvPr>
+        </p:nvSpPr>
+        <p:spPr>
+          <a:xfrm>
+            <a:off x="4022725" y="9721850"/>
+            <a:ext cx="3078300" cy="512700"/>
+          </a:xfrm>
+          <a:prstGeom prst="rect">
+            <a:avLst/>
+          </a:prstGeom>
+        </p:spPr>
+        <p:txBody>
+          <a:bodyPr spcFirstLastPara="1" wrap="square" lIns="91425" tIns="45700" rIns="91425" bIns="45700" anchor="b" anchorCtr="0">
+            <a:noAutofit/>
+          </a:bodyPr>
+          <a:lstStyle/>
+          <a:p>
+            <a:pPr marL="0" lvl="0" indent="0" algn="r" rtl="0">
+              <a:spcBef>
+                <a:spcPts val="0"/>
+              </a:spcBef>
+              <a:spcAft>
+                <a:spcPts val="0"/>
+              </a:spcAft>
+              <a:buNone/>
+            </a:pPr>
+            <a:fld id="{00000000-1234-1234-1234-123412341234}" type="slidenum">
+              <a:rPr lang="de-AT"/>
+              <a:t>11</a:t>
+            </a:fld>
+            <a:endParaRPr/>
+          </a:p>
+        </p:txBody>
+      </p:sp>
+    </p:spTree>
+  </p:cSld>
+  <p:clrMapOvr>
+    <a:masterClrMapping/>
+  </p:clrMapOvr>
+</p:notes>
+</file>
+
+<file path=ppt/notesSlides/notesSlide12.xml><?xml version="1.0" encoding="utf-8"?>
+<p:notes xmlns:a="http://schemas.openxmlformats.org/drawingml/2006/main" xmlns:r="http://schemas.openxmlformats.org/officeDocument/2006/relationships" xmlns:p="http://schemas.openxmlformats.org/presentationml/2006/main" showMasterSp="0" showMasterPhAnim="0">
+  <p:cSld>
+    <p:spTree>
+      <p:nvGrpSpPr>
+        <p:cNvPr id="1" name="Shape 196"/>
+        <p:cNvGrpSpPr/>
+        <p:nvPr/>
+      </p:nvGrpSpPr>
+      <p:grpSpPr>
+        <a:xfrm>
+          <a:off x="0" y="0"/>
+          <a:ext cx="0" cy="0"/>
+          <a:chOff x="0" y="0"/>
+          <a:chExt cx="0" cy="0"/>
+        </a:xfrm>
+      </p:grpSpPr>
+      <p:sp>
+        <p:nvSpPr>
+          <p:cNvPr id="197" name="Google Shape;197;g71d64f1754_0_52:notes"/>
+          <p:cNvSpPr>
+            <a:spLocks noGrp="1" noRot="1" noChangeAspect="1"/>
+          </p:cNvSpPr>
+          <p:nvPr>
+            <p:ph type="sldImg" idx="2"/>
+          </p:nvPr>
+        </p:nvSpPr>
+        <p:spPr>
+          <a:xfrm>
+            <a:off x="1247775" y="1279525"/>
+            <a:ext cx="4606925" cy="3454400"/>
+          </a:xfrm>
+          <a:custGeom>
+            <a:avLst/>
+            <a:gdLst/>
+            <a:ahLst/>
+            <a:cxnLst/>
+            <a:rect l="l" t="t" r="r" b="b"/>
+            <a:pathLst>
+              <a:path w="120000" h="120000" extrusionOk="0">
+                <a:moveTo>
+                  <a:pt x="0" y="0"/>
+                </a:moveTo>
+                <a:lnTo>
+                  <a:pt x="120000" y="0"/>
+                </a:lnTo>
+                <a:lnTo>
+                  <a:pt x="120000" y="120000"/>
+                </a:lnTo>
+                <a:lnTo>
+                  <a:pt x="0" y="120000"/>
+                </a:lnTo>
+                <a:close/>
+              </a:path>
+            </a:pathLst>
+          </a:custGeom>
+        </p:spPr>
+      </p:sp>
+      <p:sp>
+        <p:nvSpPr>
+          <p:cNvPr id="198" name="Google Shape;198;g71d64f1754_0_52:notes"/>
+          <p:cNvSpPr txBox="1">
+            <a:spLocks noGrp="1"/>
+          </p:cNvSpPr>
+          <p:nvPr>
+            <p:ph type="body" idx="1"/>
+          </p:nvPr>
+        </p:nvSpPr>
+        <p:spPr>
+          <a:xfrm>
+            <a:off x="709613" y="4926013"/>
+            <a:ext cx="5683200" cy="4029000"/>
+          </a:xfrm>
+          <a:prstGeom prst="rect">
+            <a:avLst/>
+          </a:prstGeom>
+        </p:spPr>
+        <p:txBody>
+          <a:bodyPr spcFirstLastPara="1" wrap="square" lIns="91425" tIns="45700" rIns="91425" bIns="45700" anchor="t" anchorCtr="0">
+            <a:noAutofit/>
+          </a:bodyPr>
+          <a:lstStyle/>
+          <a:p>
+            <a:pPr marL="0" lvl="0" indent="0" algn="l" rtl="0">
+              <a:spcBef>
+                <a:spcPts val="0"/>
+              </a:spcBef>
+              <a:spcAft>
+                <a:spcPts val="0"/>
+              </a:spcAft>
+              <a:buNone/>
+            </a:pPr>
+            <a:endParaRPr/>
+          </a:p>
+        </p:txBody>
+      </p:sp>
+      <p:sp>
+        <p:nvSpPr>
+          <p:cNvPr id="199" name="Google Shape;199;g71d64f1754_0_52:notes"/>
+          <p:cNvSpPr txBox="1">
+            <a:spLocks noGrp="1"/>
+          </p:cNvSpPr>
+          <p:nvPr>
+            <p:ph type="sldNum" idx="12"/>
+          </p:nvPr>
+        </p:nvSpPr>
+        <p:spPr>
+          <a:xfrm>
+            <a:off x="4022725" y="9721850"/>
+            <a:ext cx="3078300" cy="512700"/>
+          </a:xfrm>
+          <a:prstGeom prst="rect">
+            <a:avLst/>
+          </a:prstGeom>
+        </p:spPr>
+        <p:txBody>
+          <a:bodyPr spcFirstLastPara="1" wrap="square" lIns="91425" tIns="45700" rIns="91425" bIns="45700" anchor="b" anchorCtr="0">
+            <a:noAutofit/>
+          </a:bodyPr>
+          <a:lstStyle/>
+          <a:p>
+            <a:pPr marL="0" lvl="0" indent="0" algn="r" rtl="0">
+              <a:spcBef>
+                <a:spcPts val="0"/>
+              </a:spcBef>
+              <a:spcAft>
+                <a:spcPts val="0"/>
+              </a:spcAft>
+              <a:buNone/>
+            </a:pPr>
+            <a:fld id="{00000000-1234-1234-1234-123412341234}" type="slidenum">
+              <a:rPr lang="de-AT"/>
+              <a:t>12</a:t>
+            </a:fld>
+            <a:endParaRPr/>
+          </a:p>
+        </p:txBody>
+      </p:sp>
+    </p:spTree>
+  </p:cSld>
+  <p:clrMapOvr>
+    <a:masterClrMapping/>
+  </p:clrMapOvr>
+</p:notes>
+</file>
+
 <file path=ppt/notesSlides/notesSlide2.xml><?xml version="1.0" encoding="utf-8"?>
 <p:notes xmlns:a="http://schemas.openxmlformats.org/drawingml/2006/main" xmlns:r="http://schemas.openxmlformats.org/officeDocument/2006/relationships" xmlns:p="http://schemas.openxmlformats.org/presentationml/2006/main" showMasterSp="0" showMasterPhAnim="0">
   <p:cSld>
@@ -1763,6 +2210,11 @@
         </p:txBody>
       </p:sp>
     </p:spTree>
+    <p:extLst>
+      <p:ext uri="{BB962C8B-B14F-4D97-AF65-F5344CB8AC3E}">
+        <p14:creationId xmlns:p14="http://schemas.microsoft.com/office/powerpoint/2010/main" val="1486683393"/>
+      </p:ext>
+    </p:extLst>
   </p:cSld>
   <p:clrMapOvr>
     <a:masterClrMapping/>
@@ -1771,6 +2223,605 @@
 </file>
 
 <file path=ppt/notesSlides/notesSlide3.xml><?xml version="1.0" encoding="utf-8"?>
+<p:notes xmlns:a="http://schemas.openxmlformats.org/drawingml/2006/main" xmlns:r="http://schemas.openxmlformats.org/officeDocument/2006/relationships" xmlns:p="http://schemas.openxmlformats.org/presentationml/2006/main" showMasterSp="0" showMasterPhAnim="0">
+  <p:cSld>
+    <p:spTree>
+      <p:nvGrpSpPr>
+        <p:cNvPr id="1" name="Shape 156"/>
+        <p:cNvGrpSpPr/>
+        <p:nvPr/>
+      </p:nvGrpSpPr>
+      <p:grpSpPr>
+        <a:xfrm>
+          <a:off x="0" y="0"/>
+          <a:ext cx="0" cy="0"/>
+          <a:chOff x="0" y="0"/>
+          <a:chExt cx="0" cy="0"/>
+        </a:xfrm>
+      </p:grpSpPr>
+      <p:sp>
+        <p:nvSpPr>
+          <p:cNvPr id="157" name="Google Shape;157;g71d64f1754_0_34:notes"/>
+          <p:cNvSpPr>
+            <a:spLocks noGrp="1" noRot="1" noChangeAspect="1"/>
+          </p:cNvSpPr>
+          <p:nvPr>
+            <p:ph type="sldImg" idx="2"/>
+          </p:nvPr>
+        </p:nvSpPr>
+        <p:spPr>
+          <a:xfrm>
+            <a:off x="1247775" y="1279525"/>
+            <a:ext cx="4606925" cy="3454400"/>
+          </a:xfrm>
+          <a:custGeom>
+            <a:avLst/>
+            <a:gdLst/>
+            <a:ahLst/>
+            <a:cxnLst/>
+            <a:rect l="l" t="t" r="r" b="b"/>
+            <a:pathLst>
+              <a:path w="120000" h="120000" extrusionOk="0">
+                <a:moveTo>
+                  <a:pt x="0" y="0"/>
+                </a:moveTo>
+                <a:lnTo>
+                  <a:pt x="120000" y="0"/>
+                </a:lnTo>
+                <a:lnTo>
+                  <a:pt x="120000" y="120000"/>
+                </a:lnTo>
+                <a:lnTo>
+                  <a:pt x="0" y="120000"/>
+                </a:lnTo>
+                <a:close/>
+              </a:path>
+            </a:pathLst>
+          </a:custGeom>
+        </p:spPr>
+      </p:sp>
+      <p:sp>
+        <p:nvSpPr>
+          <p:cNvPr id="158" name="Google Shape;158;g71d64f1754_0_34:notes"/>
+          <p:cNvSpPr txBox="1">
+            <a:spLocks noGrp="1"/>
+          </p:cNvSpPr>
+          <p:nvPr>
+            <p:ph type="body" idx="1"/>
+          </p:nvPr>
+        </p:nvSpPr>
+        <p:spPr>
+          <a:xfrm>
+            <a:off x="709613" y="4926013"/>
+            <a:ext cx="5683200" cy="4029000"/>
+          </a:xfrm>
+          <a:prstGeom prst="rect">
+            <a:avLst/>
+          </a:prstGeom>
+        </p:spPr>
+        <p:txBody>
+          <a:bodyPr spcFirstLastPara="1" wrap="square" lIns="91425" tIns="45700" rIns="91425" bIns="45700" anchor="t" anchorCtr="0">
+            <a:noAutofit/>
+          </a:bodyPr>
+          <a:lstStyle/>
+          <a:p>
+            <a:pPr marL="0" lvl="0" indent="0" algn="l" rtl="0">
+              <a:spcBef>
+                <a:spcPts val="0"/>
+              </a:spcBef>
+              <a:spcAft>
+                <a:spcPts val="0"/>
+              </a:spcAft>
+              <a:buNone/>
+            </a:pPr>
+            <a:endParaRPr/>
+          </a:p>
+        </p:txBody>
+      </p:sp>
+      <p:sp>
+        <p:nvSpPr>
+          <p:cNvPr id="159" name="Google Shape;159;g71d64f1754_0_34:notes"/>
+          <p:cNvSpPr txBox="1">
+            <a:spLocks noGrp="1"/>
+          </p:cNvSpPr>
+          <p:nvPr>
+            <p:ph type="sldNum" idx="12"/>
+          </p:nvPr>
+        </p:nvSpPr>
+        <p:spPr>
+          <a:xfrm>
+            <a:off x="4022725" y="9721850"/>
+            <a:ext cx="3078300" cy="512700"/>
+          </a:xfrm>
+          <a:prstGeom prst="rect">
+            <a:avLst/>
+          </a:prstGeom>
+        </p:spPr>
+        <p:txBody>
+          <a:bodyPr spcFirstLastPara="1" wrap="square" lIns="91425" tIns="45700" rIns="91425" bIns="45700" anchor="b" anchorCtr="0">
+            <a:noAutofit/>
+          </a:bodyPr>
+          <a:lstStyle/>
+          <a:p>
+            <a:pPr marL="0" lvl="0" indent="0" algn="r" rtl="0">
+              <a:spcBef>
+                <a:spcPts val="0"/>
+              </a:spcBef>
+              <a:spcAft>
+                <a:spcPts val="0"/>
+              </a:spcAft>
+              <a:buNone/>
+            </a:pPr>
+            <a:fld id="{00000000-1234-1234-1234-123412341234}" type="slidenum">
+              <a:rPr lang="de-AT"/>
+              <a:t>3</a:t>
+            </a:fld>
+            <a:endParaRPr/>
+          </a:p>
+        </p:txBody>
+      </p:sp>
+    </p:spTree>
+  </p:cSld>
+  <p:clrMapOvr>
+    <a:masterClrMapping/>
+  </p:clrMapOvr>
+</p:notes>
+</file>
+
+<file path=ppt/notesSlides/notesSlide4.xml><?xml version="1.0" encoding="utf-8"?>
+<p:notes xmlns:a="http://schemas.openxmlformats.org/drawingml/2006/main" xmlns:r="http://schemas.openxmlformats.org/officeDocument/2006/relationships" xmlns:p="http://schemas.openxmlformats.org/presentationml/2006/main" showMasterSp="0" showMasterPhAnim="0">
+  <p:cSld>
+    <p:spTree>
+      <p:nvGrpSpPr>
+        <p:cNvPr id="1" name="Shape 156"/>
+        <p:cNvGrpSpPr/>
+        <p:nvPr/>
+      </p:nvGrpSpPr>
+      <p:grpSpPr>
+        <a:xfrm>
+          <a:off x="0" y="0"/>
+          <a:ext cx="0" cy="0"/>
+          <a:chOff x="0" y="0"/>
+          <a:chExt cx="0" cy="0"/>
+        </a:xfrm>
+      </p:grpSpPr>
+      <p:sp>
+        <p:nvSpPr>
+          <p:cNvPr id="157" name="Google Shape;157;g71d64f1754_0_34:notes"/>
+          <p:cNvSpPr>
+            <a:spLocks noGrp="1" noRot="1" noChangeAspect="1"/>
+          </p:cNvSpPr>
+          <p:nvPr>
+            <p:ph type="sldImg" idx="2"/>
+          </p:nvPr>
+        </p:nvSpPr>
+        <p:spPr>
+          <a:xfrm>
+            <a:off x="1247775" y="1279525"/>
+            <a:ext cx="4606925" cy="3454400"/>
+          </a:xfrm>
+          <a:custGeom>
+            <a:avLst/>
+            <a:gdLst/>
+            <a:ahLst/>
+            <a:cxnLst/>
+            <a:rect l="l" t="t" r="r" b="b"/>
+            <a:pathLst>
+              <a:path w="120000" h="120000" extrusionOk="0">
+                <a:moveTo>
+                  <a:pt x="0" y="0"/>
+                </a:moveTo>
+                <a:lnTo>
+                  <a:pt x="120000" y="0"/>
+                </a:lnTo>
+                <a:lnTo>
+                  <a:pt x="120000" y="120000"/>
+                </a:lnTo>
+                <a:lnTo>
+                  <a:pt x="0" y="120000"/>
+                </a:lnTo>
+                <a:close/>
+              </a:path>
+            </a:pathLst>
+          </a:custGeom>
+        </p:spPr>
+      </p:sp>
+      <p:sp>
+        <p:nvSpPr>
+          <p:cNvPr id="158" name="Google Shape;158;g71d64f1754_0_34:notes"/>
+          <p:cNvSpPr txBox="1">
+            <a:spLocks noGrp="1"/>
+          </p:cNvSpPr>
+          <p:nvPr>
+            <p:ph type="body" idx="1"/>
+          </p:nvPr>
+        </p:nvSpPr>
+        <p:spPr>
+          <a:xfrm>
+            <a:off x="709613" y="4926013"/>
+            <a:ext cx="5683200" cy="4029000"/>
+          </a:xfrm>
+          <a:prstGeom prst="rect">
+            <a:avLst/>
+          </a:prstGeom>
+        </p:spPr>
+        <p:txBody>
+          <a:bodyPr spcFirstLastPara="1" wrap="square" lIns="91425" tIns="45700" rIns="91425" bIns="45700" anchor="t" anchorCtr="0">
+            <a:noAutofit/>
+          </a:bodyPr>
+          <a:lstStyle/>
+          <a:p>
+            <a:pPr marL="0" lvl="0" indent="0" algn="l" rtl="0">
+              <a:spcBef>
+                <a:spcPts val="0"/>
+              </a:spcBef>
+              <a:spcAft>
+                <a:spcPts val="0"/>
+              </a:spcAft>
+              <a:buNone/>
+            </a:pPr>
+            <a:endParaRPr/>
+          </a:p>
+        </p:txBody>
+      </p:sp>
+      <p:sp>
+        <p:nvSpPr>
+          <p:cNvPr id="159" name="Google Shape;159;g71d64f1754_0_34:notes"/>
+          <p:cNvSpPr txBox="1">
+            <a:spLocks noGrp="1"/>
+          </p:cNvSpPr>
+          <p:nvPr>
+            <p:ph type="sldNum" idx="12"/>
+          </p:nvPr>
+        </p:nvSpPr>
+        <p:spPr>
+          <a:xfrm>
+            <a:off x="4022725" y="9721850"/>
+            <a:ext cx="3078300" cy="512700"/>
+          </a:xfrm>
+          <a:prstGeom prst="rect">
+            <a:avLst/>
+          </a:prstGeom>
+        </p:spPr>
+        <p:txBody>
+          <a:bodyPr spcFirstLastPara="1" wrap="square" lIns="91425" tIns="45700" rIns="91425" bIns="45700" anchor="b" anchorCtr="0">
+            <a:noAutofit/>
+          </a:bodyPr>
+          <a:lstStyle/>
+          <a:p>
+            <a:pPr marL="0" lvl="0" indent="0" algn="r" rtl="0">
+              <a:spcBef>
+                <a:spcPts val="0"/>
+              </a:spcBef>
+              <a:spcAft>
+                <a:spcPts val="0"/>
+              </a:spcAft>
+              <a:buNone/>
+            </a:pPr>
+            <a:fld id="{00000000-1234-1234-1234-123412341234}" type="slidenum">
+              <a:rPr lang="de-AT"/>
+              <a:t>4</a:t>
+            </a:fld>
+            <a:endParaRPr/>
+          </a:p>
+        </p:txBody>
+      </p:sp>
+    </p:spTree>
+    <p:extLst>
+      <p:ext uri="{BB962C8B-B14F-4D97-AF65-F5344CB8AC3E}">
+        <p14:creationId xmlns:p14="http://schemas.microsoft.com/office/powerpoint/2010/main" val="208912630"/>
+      </p:ext>
+    </p:extLst>
+  </p:cSld>
+  <p:clrMapOvr>
+    <a:masterClrMapping/>
+  </p:clrMapOvr>
+</p:notes>
+</file>
+
+<file path=ppt/notesSlides/notesSlide5.xml><?xml version="1.0" encoding="utf-8"?>
+<p:notes xmlns:a="http://schemas.openxmlformats.org/drawingml/2006/main" xmlns:r="http://schemas.openxmlformats.org/officeDocument/2006/relationships" xmlns:p="http://schemas.openxmlformats.org/presentationml/2006/main" showMasterSp="0" showMasterPhAnim="0">
+  <p:cSld>
+    <p:spTree>
+      <p:nvGrpSpPr>
+        <p:cNvPr id="1" name="Shape 156"/>
+        <p:cNvGrpSpPr/>
+        <p:nvPr/>
+      </p:nvGrpSpPr>
+      <p:grpSpPr>
+        <a:xfrm>
+          <a:off x="0" y="0"/>
+          <a:ext cx="0" cy="0"/>
+          <a:chOff x="0" y="0"/>
+          <a:chExt cx="0" cy="0"/>
+        </a:xfrm>
+      </p:grpSpPr>
+      <p:sp>
+        <p:nvSpPr>
+          <p:cNvPr id="157" name="Google Shape;157;g71d64f1754_0_34:notes"/>
+          <p:cNvSpPr>
+            <a:spLocks noGrp="1" noRot="1" noChangeAspect="1"/>
+          </p:cNvSpPr>
+          <p:nvPr>
+            <p:ph type="sldImg" idx="2"/>
+          </p:nvPr>
+        </p:nvSpPr>
+        <p:spPr>
+          <a:xfrm>
+            <a:off x="1247775" y="1279525"/>
+            <a:ext cx="4606925" cy="3454400"/>
+          </a:xfrm>
+          <a:custGeom>
+            <a:avLst/>
+            <a:gdLst/>
+            <a:ahLst/>
+            <a:cxnLst/>
+            <a:rect l="l" t="t" r="r" b="b"/>
+            <a:pathLst>
+              <a:path w="120000" h="120000" extrusionOk="0">
+                <a:moveTo>
+                  <a:pt x="0" y="0"/>
+                </a:moveTo>
+                <a:lnTo>
+                  <a:pt x="120000" y="0"/>
+                </a:lnTo>
+                <a:lnTo>
+                  <a:pt x="120000" y="120000"/>
+                </a:lnTo>
+                <a:lnTo>
+                  <a:pt x="0" y="120000"/>
+                </a:lnTo>
+                <a:close/>
+              </a:path>
+            </a:pathLst>
+          </a:custGeom>
+        </p:spPr>
+      </p:sp>
+      <p:sp>
+        <p:nvSpPr>
+          <p:cNvPr id="158" name="Google Shape;158;g71d64f1754_0_34:notes"/>
+          <p:cNvSpPr txBox="1">
+            <a:spLocks noGrp="1"/>
+          </p:cNvSpPr>
+          <p:nvPr>
+            <p:ph type="body" idx="1"/>
+          </p:nvPr>
+        </p:nvSpPr>
+        <p:spPr>
+          <a:xfrm>
+            <a:off x="709613" y="4926013"/>
+            <a:ext cx="5683200" cy="4029000"/>
+          </a:xfrm>
+          <a:prstGeom prst="rect">
+            <a:avLst/>
+          </a:prstGeom>
+        </p:spPr>
+        <p:txBody>
+          <a:bodyPr spcFirstLastPara="1" wrap="square" lIns="91425" tIns="45700" rIns="91425" bIns="45700" anchor="t" anchorCtr="0">
+            <a:noAutofit/>
+          </a:bodyPr>
+          <a:lstStyle/>
+          <a:p>
+            <a:pPr marL="0" lvl="0" indent="0" algn="l" rtl="0">
+              <a:spcBef>
+                <a:spcPts val="0"/>
+              </a:spcBef>
+              <a:spcAft>
+                <a:spcPts val="0"/>
+              </a:spcAft>
+              <a:buNone/>
+            </a:pPr>
+            <a:endParaRPr/>
+          </a:p>
+        </p:txBody>
+      </p:sp>
+      <p:sp>
+        <p:nvSpPr>
+          <p:cNvPr id="159" name="Google Shape;159;g71d64f1754_0_34:notes"/>
+          <p:cNvSpPr txBox="1">
+            <a:spLocks noGrp="1"/>
+          </p:cNvSpPr>
+          <p:nvPr>
+            <p:ph type="sldNum" idx="12"/>
+          </p:nvPr>
+        </p:nvSpPr>
+        <p:spPr>
+          <a:xfrm>
+            <a:off x="4022725" y="9721850"/>
+            <a:ext cx="3078300" cy="512700"/>
+          </a:xfrm>
+          <a:prstGeom prst="rect">
+            <a:avLst/>
+          </a:prstGeom>
+        </p:spPr>
+        <p:txBody>
+          <a:bodyPr spcFirstLastPara="1" wrap="square" lIns="91425" tIns="45700" rIns="91425" bIns="45700" anchor="b" anchorCtr="0">
+            <a:noAutofit/>
+          </a:bodyPr>
+          <a:lstStyle/>
+          <a:p>
+            <a:pPr marL="0" lvl="0" indent="0" algn="r" rtl="0">
+              <a:spcBef>
+                <a:spcPts val="0"/>
+              </a:spcBef>
+              <a:spcAft>
+                <a:spcPts val="0"/>
+              </a:spcAft>
+              <a:buNone/>
+            </a:pPr>
+            <a:fld id="{00000000-1234-1234-1234-123412341234}" type="slidenum">
+              <a:rPr lang="de-AT"/>
+              <a:t>5</a:t>
+            </a:fld>
+            <a:endParaRPr/>
+          </a:p>
+        </p:txBody>
+      </p:sp>
+    </p:spTree>
+    <p:extLst>
+      <p:ext uri="{BB962C8B-B14F-4D97-AF65-F5344CB8AC3E}">
+        <p14:creationId xmlns:p14="http://schemas.microsoft.com/office/powerpoint/2010/main" val="2839906009"/>
+      </p:ext>
+    </p:extLst>
+  </p:cSld>
+  <p:clrMapOvr>
+    <a:masterClrMapping/>
+  </p:clrMapOvr>
+</p:notes>
+</file>
+
+<file path=ppt/notesSlides/notesSlide6.xml><?xml version="1.0" encoding="utf-8"?>
+<p:notes xmlns:a="http://schemas.openxmlformats.org/drawingml/2006/main" xmlns:r="http://schemas.openxmlformats.org/officeDocument/2006/relationships" xmlns:p="http://schemas.openxmlformats.org/presentationml/2006/main" showMasterSp="0" showMasterPhAnim="0">
+  <p:cSld>
+    <p:spTree>
+      <p:nvGrpSpPr>
+        <p:cNvPr id="1" name="Shape 156"/>
+        <p:cNvGrpSpPr/>
+        <p:nvPr/>
+      </p:nvGrpSpPr>
+      <p:grpSpPr>
+        <a:xfrm>
+          <a:off x="0" y="0"/>
+          <a:ext cx="0" cy="0"/>
+          <a:chOff x="0" y="0"/>
+          <a:chExt cx="0" cy="0"/>
+        </a:xfrm>
+      </p:grpSpPr>
+      <p:sp>
+        <p:nvSpPr>
+          <p:cNvPr id="157" name="Google Shape;157;g71d64f1754_0_34:notes"/>
+          <p:cNvSpPr>
+            <a:spLocks noGrp="1" noRot="1" noChangeAspect="1"/>
+          </p:cNvSpPr>
+          <p:nvPr>
+            <p:ph type="sldImg" idx="2"/>
+          </p:nvPr>
+        </p:nvSpPr>
+        <p:spPr>
+          <a:xfrm>
+            <a:off x="1247775" y="1279525"/>
+            <a:ext cx="4606925" cy="3454400"/>
+          </a:xfrm>
+          <a:custGeom>
+            <a:avLst/>
+            <a:gdLst/>
+            <a:ahLst/>
+            <a:cxnLst/>
+            <a:rect l="l" t="t" r="r" b="b"/>
+            <a:pathLst>
+              <a:path w="120000" h="120000" extrusionOk="0">
+                <a:moveTo>
+                  <a:pt x="0" y="0"/>
+                </a:moveTo>
+                <a:lnTo>
+                  <a:pt x="120000" y="0"/>
+                </a:lnTo>
+                <a:lnTo>
+                  <a:pt x="120000" y="120000"/>
+                </a:lnTo>
+                <a:lnTo>
+                  <a:pt x="0" y="120000"/>
+                </a:lnTo>
+                <a:close/>
+              </a:path>
+            </a:pathLst>
+          </a:custGeom>
+        </p:spPr>
+      </p:sp>
+      <p:sp>
+        <p:nvSpPr>
+          <p:cNvPr id="158" name="Google Shape;158;g71d64f1754_0_34:notes"/>
+          <p:cNvSpPr txBox="1">
+            <a:spLocks noGrp="1"/>
+          </p:cNvSpPr>
+          <p:nvPr>
+            <p:ph type="body" idx="1"/>
+          </p:nvPr>
+        </p:nvSpPr>
+        <p:spPr>
+          <a:xfrm>
+            <a:off x="709613" y="4926013"/>
+            <a:ext cx="5683200" cy="4029000"/>
+          </a:xfrm>
+          <a:prstGeom prst="rect">
+            <a:avLst/>
+          </a:prstGeom>
+        </p:spPr>
+        <p:txBody>
+          <a:bodyPr spcFirstLastPara="1" wrap="square" lIns="91425" tIns="45700" rIns="91425" bIns="45700" anchor="t" anchorCtr="0">
+            <a:noAutofit/>
+          </a:bodyPr>
+          <a:lstStyle/>
+          <a:p>
+            <a:pPr marL="0" lvl="0" indent="0" algn="l" rtl="0">
+              <a:spcBef>
+                <a:spcPts val="0"/>
+              </a:spcBef>
+              <a:spcAft>
+                <a:spcPts val="0"/>
+              </a:spcAft>
+              <a:buNone/>
+            </a:pPr>
+            <a:endParaRPr/>
+          </a:p>
+        </p:txBody>
+      </p:sp>
+      <p:sp>
+        <p:nvSpPr>
+          <p:cNvPr id="159" name="Google Shape;159;g71d64f1754_0_34:notes"/>
+          <p:cNvSpPr txBox="1">
+            <a:spLocks noGrp="1"/>
+          </p:cNvSpPr>
+          <p:nvPr>
+            <p:ph type="sldNum" idx="12"/>
+          </p:nvPr>
+        </p:nvSpPr>
+        <p:spPr>
+          <a:xfrm>
+            <a:off x="4022725" y="9721850"/>
+            <a:ext cx="3078300" cy="512700"/>
+          </a:xfrm>
+          <a:prstGeom prst="rect">
+            <a:avLst/>
+          </a:prstGeom>
+        </p:spPr>
+        <p:txBody>
+          <a:bodyPr spcFirstLastPara="1" wrap="square" lIns="91425" tIns="45700" rIns="91425" bIns="45700" anchor="b" anchorCtr="0">
+            <a:noAutofit/>
+          </a:bodyPr>
+          <a:lstStyle/>
+          <a:p>
+            <a:pPr marL="0" lvl="0" indent="0" algn="r" rtl="0">
+              <a:spcBef>
+                <a:spcPts val="0"/>
+              </a:spcBef>
+              <a:spcAft>
+                <a:spcPts val="0"/>
+              </a:spcAft>
+              <a:buNone/>
+            </a:pPr>
+            <a:fld id="{00000000-1234-1234-1234-123412341234}" type="slidenum">
+              <a:rPr lang="de-AT"/>
+              <a:t>6</a:t>
+            </a:fld>
+            <a:endParaRPr/>
+          </a:p>
+        </p:txBody>
+      </p:sp>
+    </p:spTree>
+    <p:extLst>
+      <p:ext uri="{BB962C8B-B14F-4D97-AF65-F5344CB8AC3E}">
+        <p14:creationId xmlns:p14="http://schemas.microsoft.com/office/powerpoint/2010/main" val="930002338"/>
+      </p:ext>
+    </p:extLst>
+  </p:cSld>
+  <p:clrMapOvr>
+    <a:masterClrMapping/>
+  </p:clrMapOvr>
+</p:notes>
+</file>
+
+<file path=ppt/notesSlides/notesSlide7.xml><?xml version="1.0" encoding="utf-8"?>
 <p:notes xmlns:a="http://schemas.openxmlformats.org/drawingml/2006/main" xmlns:r="http://schemas.openxmlformats.org/officeDocument/2006/relationships" xmlns:p="http://schemas.openxmlformats.org/presentationml/2006/main" showMasterSp="0" showMasterPhAnim="0">
   <p:cSld>
     <p:spTree>
@@ -1902,7 +2953,7 @@
             </a:pPr>
             <a:fld id="{00000000-1234-1234-1234-123412341234}" type="slidenum">
               <a:rPr lang="de-AT"/>
-              <a:t>3</a:t>
+              <a:t>7</a:t>
             </a:fld>
             <a:endParaRPr/>
           </a:p>
@@ -1921,7 +2972,7 @@
 </p:notes>
 </file>
 
-<file path=ppt/notesSlides/notesSlide4.xml><?xml version="1.0" encoding="utf-8"?>
+<file path=ppt/notesSlides/notesSlide8.xml><?xml version="1.0" encoding="utf-8"?>
 <p:notes xmlns:a="http://schemas.openxmlformats.org/drawingml/2006/main" xmlns:r="http://schemas.openxmlformats.org/officeDocument/2006/relationships" xmlns:p="http://schemas.openxmlformats.org/presentationml/2006/main" showMasterSp="0" showMasterPhAnim="0">
   <p:cSld>
     <p:spTree>
@@ -2053,7 +3104,7 @@
             </a:pPr>
             <a:fld id="{00000000-1234-1234-1234-123412341234}" type="slidenum">
               <a:rPr lang="de-AT"/>
-              <a:t>4</a:t>
+              <a:t>8</a:t>
             </a:fld>
             <a:endParaRPr/>
           </a:p>
@@ -2072,7 +3123,7 @@
 </p:notes>
 </file>
 
-<file path=ppt/notesSlides/notesSlide5.xml><?xml version="1.0" encoding="utf-8"?>
+<file path=ppt/notesSlides/notesSlide9.xml><?xml version="1.0" encoding="utf-8"?>
 <p:notes xmlns:a="http://schemas.openxmlformats.org/drawingml/2006/main" xmlns:r="http://schemas.openxmlformats.org/officeDocument/2006/relationships" xmlns:p="http://schemas.openxmlformats.org/presentationml/2006/main" showMasterSp="0" showMasterPhAnim="0">
   <p:cSld>
     <p:spTree>
@@ -2204,450 +3255,7 @@
             </a:pPr>
             <a:fld id="{00000000-1234-1234-1234-123412341234}" type="slidenum">
               <a:rPr lang="de-AT"/>
-              <a:t>5</a:t>
-            </a:fld>
-            <a:endParaRPr/>
-          </a:p>
-        </p:txBody>
-      </p:sp>
-    </p:spTree>
-  </p:cSld>
-  <p:clrMapOvr>
-    <a:masterClrMapping/>
-  </p:clrMapOvr>
-</p:notes>
-</file>
-
-<file path=ppt/notesSlides/notesSlide6.xml><?xml version="1.0" encoding="utf-8"?>
-<p:notes xmlns:a="http://schemas.openxmlformats.org/drawingml/2006/main" xmlns:r="http://schemas.openxmlformats.org/officeDocument/2006/relationships" xmlns:p="http://schemas.openxmlformats.org/presentationml/2006/main" showMasterSp="0" showMasterPhAnim="0">
-  <p:cSld>
-    <p:spTree>
-      <p:nvGrpSpPr>
-        <p:cNvPr id="1" name="Shape 176"/>
-        <p:cNvGrpSpPr/>
-        <p:nvPr/>
-      </p:nvGrpSpPr>
-      <p:grpSpPr>
-        <a:xfrm>
-          <a:off x="0" y="0"/>
-          <a:ext cx="0" cy="0"/>
-          <a:chOff x="0" y="0"/>
-          <a:chExt cx="0" cy="0"/>
-        </a:xfrm>
-      </p:grpSpPr>
-      <p:sp>
-        <p:nvSpPr>
-          <p:cNvPr id="177" name="Google Shape;177;g71d64f1754_0_16:notes"/>
-          <p:cNvSpPr>
-            <a:spLocks noGrp="1" noRot="1" noChangeAspect="1"/>
-          </p:cNvSpPr>
-          <p:nvPr>
-            <p:ph type="sldImg" idx="2"/>
-          </p:nvPr>
-        </p:nvSpPr>
-        <p:spPr>
-          <a:xfrm>
-            <a:off x="1247775" y="1279525"/>
-            <a:ext cx="4606925" cy="3454400"/>
-          </a:xfrm>
-          <a:custGeom>
-            <a:avLst/>
-            <a:gdLst/>
-            <a:ahLst/>
-            <a:cxnLst/>
-            <a:rect l="l" t="t" r="r" b="b"/>
-            <a:pathLst>
-              <a:path w="120000" h="120000" extrusionOk="0">
-                <a:moveTo>
-                  <a:pt x="0" y="0"/>
-                </a:moveTo>
-                <a:lnTo>
-                  <a:pt x="120000" y="0"/>
-                </a:lnTo>
-                <a:lnTo>
-                  <a:pt x="120000" y="120000"/>
-                </a:lnTo>
-                <a:lnTo>
-                  <a:pt x="0" y="120000"/>
-                </a:lnTo>
-                <a:close/>
-              </a:path>
-            </a:pathLst>
-          </a:custGeom>
-        </p:spPr>
-      </p:sp>
-      <p:sp>
-        <p:nvSpPr>
-          <p:cNvPr id="178" name="Google Shape;178;g71d64f1754_0_16:notes"/>
-          <p:cNvSpPr txBox="1">
-            <a:spLocks noGrp="1"/>
-          </p:cNvSpPr>
-          <p:nvPr>
-            <p:ph type="body" idx="1"/>
-          </p:nvPr>
-        </p:nvSpPr>
-        <p:spPr>
-          <a:xfrm>
-            <a:off x="709613" y="4926013"/>
-            <a:ext cx="5683200" cy="4029000"/>
-          </a:xfrm>
-          <a:prstGeom prst="rect">
-            <a:avLst/>
-          </a:prstGeom>
-        </p:spPr>
-        <p:txBody>
-          <a:bodyPr spcFirstLastPara="1" wrap="square" lIns="91425" tIns="45700" rIns="91425" bIns="45700" anchor="t" anchorCtr="0">
-            <a:noAutofit/>
-          </a:bodyPr>
-          <a:lstStyle/>
-          <a:p>
-            <a:pPr marL="0" lvl="0" indent="0" algn="l" rtl="0">
-              <a:spcBef>
-                <a:spcPts val="0"/>
-              </a:spcBef>
-              <a:spcAft>
-                <a:spcPts val="0"/>
-              </a:spcAft>
-              <a:buNone/>
-            </a:pPr>
-            <a:endParaRPr/>
-          </a:p>
-        </p:txBody>
-      </p:sp>
-      <p:sp>
-        <p:nvSpPr>
-          <p:cNvPr id="179" name="Google Shape;179;g71d64f1754_0_16:notes"/>
-          <p:cNvSpPr txBox="1">
-            <a:spLocks noGrp="1"/>
-          </p:cNvSpPr>
-          <p:nvPr>
-            <p:ph type="sldNum" idx="12"/>
-          </p:nvPr>
-        </p:nvSpPr>
-        <p:spPr>
-          <a:xfrm>
-            <a:off x="4022725" y="9721850"/>
-            <a:ext cx="3078300" cy="512700"/>
-          </a:xfrm>
-          <a:prstGeom prst="rect">
-            <a:avLst/>
-          </a:prstGeom>
-        </p:spPr>
-        <p:txBody>
-          <a:bodyPr spcFirstLastPara="1" wrap="square" lIns="91425" tIns="45700" rIns="91425" bIns="45700" anchor="b" anchorCtr="0">
-            <a:noAutofit/>
-          </a:bodyPr>
-          <a:lstStyle/>
-          <a:p>
-            <a:pPr marL="0" lvl="0" indent="0" algn="r" rtl="0">
-              <a:spcBef>
-                <a:spcPts val="0"/>
-              </a:spcBef>
-              <a:spcAft>
-                <a:spcPts val="0"/>
-              </a:spcAft>
-              <a:buNone/>
-            </a:pPr>
-            <a:fld id="{00000000-1234-1234-1234-123412341234}" type="slidenum">
-              <a:rPr lang="de-AT"/>
-              <a:t>6</a:t>
-            </a:fld>
-            <a:endParaRPr/>
-          </a:p>
-        </p:txBody>
-      </p:sp>
-    </p:spTree>
-    <p:extLst>
-      <p:ext uri="{BB962C8B-B14F-4D97-AF65-F5344CB8AC3E}">
-        <p14:creationId xmlns:p14="http://schemas.microsoft.com/office/powerpoint/2010/main" val="3347095781"/>
-      </p:ext>
-    </p:extLst>
-  </p:cSld>
-  <p:clrMapOvr>
-    <a:masterClrMapping/>
-  </p:clrMapOvr>
-</p:notes>
-</file>
-
-<file path=ppt/notesSlides/notesSlide7.xml><?xml version="1.0" encoding="utf-8"?>
-<p:notes xmlns:a="http://schemas.openxmlformats.org/drawingml/2006/main" xmlns:r="http://schemas.openxmlformats.org/officeDocument/2006/relationships" xmlns:p="http://schemas.openxmlformats.org/presentationml/2006/main" showMasterSp="0" showMasterPhAnim="0">
-  <p:cSld>
-    <p:spTree>
-      <p:nvGrpSpPr>
-        <p:cNvPr id="1" name="Shape 186"/>
-        <p:cNvGrpSpPr/>
-        <p:nvPr/>
-      </p:nvGrpSpPr>
-      <p:grpSpPr>
-        <a:xfrm>
-          <a:off x="0" y="0"/>
-          <a:ext cx="0" cy="0"/>
-          <a:chOff x="0" y="0"/>
-          <a:chExt cx="0" cy="0"/>
-        </a:xfrm>
-      </p:grpSpPr>
-      <p:sp>
-        <p:nvSpPr>
-          <p:cNvPr id="187" name="Google Shape;187;g71d64f1754_0_25:notes"/>
-          <p:cNvSpPr>
-            <a:spLocks noGrp="1" noRot="1" noChangeAspect="1"/>
-          </p:cNvSpPr>
-          <p:nvPr>
-            <p:ph type="sldImg" idx="2"/>
-          </p:nvPr>
-        </p:nvSpPr>
-        <p:spPr>
-          <a:xfrm>
-            <a:off x="1247775" y="1279525"/>
-            <a:ext cx="4606925" cy="3454400"/>
-          </a:xfrm>
-          <a:custGeom>
-            <a:avLst/>
-            <a:gdLst/>
-            <a:ahLst/>
-            <a:cxnLst/>
-            <a:rect l="l" t="t" r="r" b="b"/>
-            <a:pathLst>
-              <a:path w="120000" h="120000" extrusionOk="0">
-                <a:moveTo>
-                  <a:pt x="0" y="0"/>
-                </a:moveTo>
-                <a:lnTo>
-                  <a:pt x="120000" y="0"/>
-                </a:lnTo>
-                <a:lnTo>
-                  <a:pt x="120000" y="120000"/>
-                </a:lnTo>
-                <a:lnTo>
-                  <a:pt x="0" y="120000"/>
-                </a:lnTo>
-                <a:close/>
-              </a:path>
-            </a:pathLst>
-          </a:custGeom>
-        </p:spPr>
-      </p:sp>
-      <p:sp>
-        <p:nvSpPr>
-          <p:cNvPr id="188" name="Google Shape;188;g71d64f1754_0_25:notes"/>
-          <p:cNvSpPr txBox="1">
-            <a:spLocks noGrp="1"/>
-          </p:cNvSpPr>
-          <p:nvPr>
-            <p:ph type="body" idx="1"/>
-          </p:nvPr>
-        </p:nvSpPr>
-        <p:spPr>
-          <a:xfrm>
-            <a:off x="709613" y="4926013"/>
-            <a:ext cx="5683200" cy="4029000"/>
-          </a:xfrm>
-          <a:prstGeom prst="rect">
-            <a:avLst/>
-          </a:prstGeom>
-        </p:spPr>
-        <p:txBody>
-          <a:bodyPr spcFirstLastPara="1" wrap="square" lIns="91425" tIns="45700" rIns="91425" bIns="45700" anchor="t" anchorCtr="0">
-            <a:noAutofit/>
-          </a:bodyPr>
-          <a:lstStyle/>
-          <a:p>
-            <a:pPr marL="0" lvl="0" indent="0" algn="l" rtl="0">
-              <a:spcBef>
-                <a:spcPts val="0"/>
-              </a:spcBef>
-              <a:spcAft>
-                <a:spcPts val="0"/>
-              </a:spcAft>
-              <a:buNone/>
-            </a:pPr>
-            <a:endParaRPr/>
-          </a:p>
-        </p:txBody>
-      </p:sp>
-      <p:sp>
-        <p:nvSpPr>
-          <p:cNvPr id="189" name="Google Shape;189;g71d64f1754_0_25:notes"/>
-          <p:cNvSpPr txBox="1">
-            <a:spLocks noGrp="1"/>
-          </p:cNvSpPr>
-          <p:nvPr>
-            <p:ph type="sldNum" idx="12"/>
-          </p:nvPr>
-        </p:nvSpPr>
-        <p:spPr>
-          <a:xfrm>
-            <a:off x="4022725" y="9721850"/>
-            <a:ext cx="3078300" cy="512700"/>
-          </a:xfrm>
-          <a:prstGeom prst="rect">
-            <a:avLst/>
-          </a:prstGeom>
-        </p:spPr>
-        <p:txBody>
-          <a:bodyPr spcFirstLastPara="1" wrap="square" lIns="91425" tIns="45700" rIns="91425" bIns="45700" anchor="b" anchorCtr="0">
-            <a:noAutofit/>
-          </a:bodyPr>
-          <a:lstStyle/>
-          <a:p>
-            <a:pPr marL="0" lvl="0" indent="0" algn="r" rtl="0">
-              <a:spcBef>
-                <a:spcPts val="0"/>
-              </a:spcBef>
-              <a:spcAft>
-                <a:spcPts val="0"/>
-              </a:spcAft>
-              <a:buNone/>
-            </a:pPr>
-            <a:fld id="{00000000-1234-1234-1234-123412341234}" type="slidenum">
-              <a:rPr lang="de-AT"/>
-              <a:t>7</a:t>
-            </a:fld>
-            <a:endParaRPr/>
-          </a:p>
-        </p:txBody>
-      </p:sp>
-    </p:spTree>
-  </p:cSld>
-  <p:clrMapOvr>
-    <a:masterClrMapping/>
-  </p:clrMapOvr>
-</p:notes>
-</file>
-
-<file path=ppt/notesSlides/notesSlide8.xml><?xml version="1.0" encoding="utf-8"?>
-<p:notes xmlns:a="http://schemas.openxmlformats.org/drawingml/2006/main" xmlns:r="http://schemas.openxmlformats.org/officeDocument/2006/relationships" xmlns:p="http://schemas.openxmlformats.org/presentationml/2006/main" showMasterSp="0" showMasterPhAnim="0">
-  <p:cSld>
-    <p:spTree>
-      <p:nvGrpSpPr>
-        <p:cNvPr id="1" name="Shape 196"/>
-        <p:cNvGrpSpPr/>
-        <p:nvPr/>
-      </p:nvGrpSpPr>
-      <p:grpSpPr>
-        <a:xfrm>
-          <a:off x="0" y="0"/>
-          <a:ext cx="0" cy="0"/>
-          <a:chOff x="0" y="0"/>
-          <a:chExt cx="0" cy="0"/>
-        </a:xfrm>
-      </p:grpSpPr>
-      <p:sp>
-        <p:nvSpPr>
-          <p:cNvPr id="197" name="Google Shape;197;g71d64f1754_0_52:notes"/>
-          <p:cNvSpPr>
-            <a:spLocks noGrp="1" noRot="1" noChangeAspect="1"/>
-          </p:cNvSpPr>
-          <p:nvPr>
-            <p:ph type="sldImg" idx="2"/>
-          </p:nvPr>
-        </p:nvSpPr>
-        <p:spPr>
-          <a:xfrm>
-            <a:off x="1247775" y="1279525"/>
-            <a:ext cx="4606925" cy="3454400"/>
-          </a:xfrm>
-          <a:custGeom>
-            <a:avLst/>
-            <a:gdLst/>
-            <a:ahLst/>
-            <a:cxnLst/>
-            <a:rect l="l" t="t" r="r" b="b"/>
-            <a:pathLst>
-              <a:path w="120000" h="120000" extrusionOk="0">
-                <a:moveTo>
-                  <a:pt x="0" y="0"/>
-                </a:moveTo>
-                <a:lnTo>
-                  <a:pt x="120000" y="0"/>
-                </a:lnTo>
-                <a:lnTo>
-                  <a:pt x="120000" y="120000"/>
-                </a:lnTo>
-                <a:lnTo>
-                  <a:pt x="0" y="120000"/>
-                </a:lnTo>
-                <a:close/>
-              </a:path>
-            </a:pathLst>
-          </a:custGeom>
-        </p:spPr>
-      </p:sp>
-      <p:sp>
-        <p:nvSpPr>
-          <p:cNvPr id="198" name="Google Shape;198;g71d64f1754_0_52:notes"/>
-          <p:cNvSpPr txBox="1">
-            <a:spLocks noGrp="1"/>
-          </p:cNvSpPr>
-          <p:nvPr>
-            <p:ph type="body" idx="1"/>
-          </p:nvPr>
-        </p:nvSpPr>
-        <p:spPr>
-          <a:xfrm>
-            <a:off x="709613" y="4926013"/>
-            <a:ext cx="5683200" cy="4029000"/>
-          </a:xfrm>
-          <a:prstGeom prst="rect">
-            <a:avLst/>
-          </a:prstGeom>
-        </p:spPr>
-        <p:txBody>
-          <a:bodyPr spcFirstLastPara="1" wrap="square" lIns="91425" tIns="45700" rIns="91425" bIns="45700" anchor="t" anchorCtr="0">
-            <a:noAutofit/>
-          </a:bodyPr>
-          <a:lstStyle/>
-          <a:p>
-            <a:pPr marL="0" lvl="0" indent="0" algn="l" rtl="0">
-              <a:spcBef>
-                <a:spcPts val="0"/>
-              </a:spcBef>
-              <a:spcAft>
-                <a:spcPts val="0"/>
-              </a:spcAft>
-              <a:buNone/>
-            </a:pPr>
-            <a:endParaRPr/>
-          </a:p>
-        </p:txBody>
-      </p:sp>
-      <p:sp>
-        <p:nvSpPr>
-          <p:cNvPr id="199" name="Google Shape;199;g71d64f1754_0_52:notes"/>
-          <p:cNvSpPr txBox="1">
-            <a:spLocks noGrp="1"/>
-          </p:cNvSpPr>
-          <p:nvPr>
-            <p:ph type="sldNum" idx="12"/>
-          </p:nvPr>
-        </p:nvSpPr>
-        <p:spPr>
-          <a:xfrm>
-            <a:off x="4022725" y="9721850"/>
-            <a:ext cx="3078300" cy="512700"/>
-          </a:xfrm>
-          <a:prstGeom prst="rect">
-            <a:avLst/>
-          </a:prstGeom>
-        </p:spPr>
-        <p:txBody>
-          <a:bodyPr spcFirstLastPara="1" wrap="square" lIns="91425" tIns="45700" rIns="91425" bIns="45700" anchor="b" anchorCtr="0">
-            <a:noAutofit/>
-          </a:bodyPr>
-          <a:lstStyle/>
-          <a:p>
-            <a:pPr marL="0" lvl="0" indent="0" algn="r" rtl="0">
-              <a:spcBef>
-                <a:spcPts val="0"/>
-              </a:spcBef>
-              <a:spcAft>
-                <a:spcPts val="0"/>
-              </a:spcAft>
-              <a:buNone/>
-            </a:pPr>
-            <a:fld id="{00000000-1234-1234-1234-123412341234}" type="slidenum">
-              <a:rPr lang="de-AT"/>
-              <a:t>8</a:t>
+              <a:t>9</a:t>
             </a:fld>
             <a:endParaRPr/>
           </a:p>
@@ -22990,10 +23598,9 @@
               <a:buNone/>
             </a:pPr>
             <a:r>
-              <a:rPr lang="en-US" sz="3500"/>
+              <a:rPr lang="en-US" sz="3500" dirty="0"/>
               <a:t>Release 2</a:t>
             </a:r>
-            <a:endParaRPr lang="en-US" sz="3500" dirty="0"/>
           </a:p>
           <a:p>
             <a:pPr marL="0" lvl="0" indent="0" algn="l" rtl="0">
@@ -23007,7 +23614,7 @@
             </a:pPr>
             <a:r>
               <a:rPr lang="en-US" sz="3500" dirty="0"/>
-              <a:t>Team x</a:t>
+              <a:t>Team 2</a:t>
             </a:r>
           </a:p>
         </p:txBody>
@@ -23047,8 +23654,778 @@
               <a:buNone/>
             </a:pPr>
             <a:r>
-              <a:rPr lang="en-US"/>
-              <a:t>Teammember1, Teammember2, Teammember3,</a:t>
+              <a:rPr lang="en-US" dirty="0"/>
+              <a:t>Elma </a:t>
+            </a:r>
+            <a:r>
+              <a:rPr lang="en-US" dirty="0" err="1"/>
+              <a:t>Buljina</a:t>
+            </a:r>
+            <a:r>
+              <a:rPr lang="en-US" dirty="0"/>
+              <a:t>, Nuray </a:t>
+            </a:r>
+            <a:r>
+              <a:rPr lang="en-US" dirty="0" err="1"/>
+              <a:t>Seker</a:t>
+            </a:r>
+            <a:r>
+              <a:rPr lang="en-US" dirty="0"/>
+              <a:t>, Abir Sikder, Stefan </a:t>
+            </a:r>
+            <a:r>
+              <a:rPr lang="en-US" dirty="0" err="1"/>
+              <a:t>Pilgerstorfer</a:t>
+            </a:r>
+            <a:endParaRPr lang="en-US" dirty="0"/>
+          </a:p>
+        </p:txBody>
+      </p:sp>
+    </p:spTree>
+  </p:cSld>
+  <p:clrMapOvr>
+    <a:masterClrMapping/>
+  </p:clrMapOvr>
+</p:sld>
+</file>
+
+<file path=ppt/slides/slide10.xml><?xml version="1.0" encoding="utf-8"?>
+<p:sld xmlns:a="http://schemas.openxmlformats.org/drawingml/2006/main" xmlns:r="http://schemas.openxmlformats.org/officeDocument/2006/relationships" xmlns:p="http://schemas.openxmlformats.org/presentationml/2006/main">
+  <p:cSld>
+    <p:spTree>
+      <p:nvGrpSpPr>
+        <p:cNvPr id="1" name="Shape 180"/>
+        <p:cNvGrpSpPr/>
+        <p:nvPr/>
+      </p:nvGrpSpPr>
+      <p:grpSpPr>
+        <a:xfrm>
+          <a:off x="0" y="0"/>
+          <a:ext cx="0" cy="0"/>
+          <a:chOff x="0" y="0"/>
+          <a:chExt cx="0" cy="0"/>
+        </a:xfrm>
+      </p:grpSpPr>
+      <p:sp>
+        <p:nvSpPr>
+          <p:cNvPr id="181" name="Google Shape;181;g71d64f1754_0_16"/>
+          <p:cNvSpPr txBox="1">
+            <a:spLocks noGrp="1"/>
+          </p:cNvSpPr>
+          <p:nvPr>
+            <p:ph type="body" idx="1"/>
+          </p:nvPr>
+        </p:nvSpPr>
+        <p:spPr>
+          <a:xfrm>
+            <a:off x="548268" y="5927411"/>
+            <a:ext cx="7925400" cy="278700"/>
+          </a:xfrm>
+          <a:prstGeom prst="rect">
+            <a:avLst/>
+          </a:prstGeom>
+        </p:spPr>
+        <p:txBody>
+          <a:bodyPr spcFirstLastPara="1" wrap="square" lIns="91425" tIns="45700" rIns="91425" bIns="45700" anchor="b" anchorCtr="0">
+            <a:noAutofit/>
+          </a:bodyPr>
+          <a:lstStyle/>
+          <a:p>
+            <a:pPr marL="0" lvl="0" indent="0" algn="l" rtl="0">
+              <a:spcBef>
+                <a:spcPts val="0"/>
+              </a:spcBef>
+              <a:spcAft>
+                <a:spcPts val="600"/>
+              </a:spcAft>
+              <a:buNone/>
+            </a:pPr>
+            <a:endParaRPr/>
+          </a:p>
+        </p:txBody>
+      </p:sp>
+      <p:sp>
+        <p:nvSpPr>
+          <p:cNvPr id="182" name="Google Shape;182;g71d64f1754_0_16"/>
+          <p:cNvSpPr txBox="1">
+            <a:spLocks noGrp="1"/>
+          </p:cNvSpPr>
+          <p:nvPr>
+            <p:ph type="title"/>
+          </p:nvPr>
+        </p:nvSpPr>
+        <p:spPr>
+          <a:xfrm>
+            <a:off x="549322" y="651700"/>
+            <a:ext cx="7938300" cy="938700"/>
+          </a:xfrm>
+          <a:prstGeom prst="rect">
+            <a:avLst/>
+          </a:prstGeom>
+        </p:spPr>
+        <p:txBody>
+          <a:bodyPr spcFirstLastPara="1" wrap="square" lIns="91425" tIns="45700" rIns="91425" bIns="45700" anchor="t" anchorCtr="0">
+            <a:noAutofit/>
+          </a:bodyPr>
+          <a:lstStyle/>
+          <a:p>
+            <a:pPr marL="0" lvl="0" indent="0" algn="l" rtl="0">
+              <a:spcBef>
+                <a:spcPts val="0"/>
+              </a:spcBef>
+              <a:spcAft>
+                <a:spcPts val="0"/>
+              </a:spcAft>
+              <a:buNone/>
+            </a:pPr>
+            <a:r>
+              <a:rPr lang="en-US" dirty="0"/>
+              <a:t>Task Distribution</a:t>
+            </a:r>
+          </a:p>
+        </p:txBody>
+      </p:sp>
+      <p:sp>
+        <p:nvSpPr>
+          <p:cNvPr id="183" name="Google Shape;183;g71d64f1754_0_16"/>
+          <p:cNvSpPr>
+            <a:spLocks noGrp="1"/>
+          </p:cNvSpPr>
+          <p:nvPr>
+            <p:ph type="pic" idx="2"/>
+          </p:nvPr>
+        </p:nvSpPr>
+        <p:spPr>
+          <a:xfrm>
+            <a:off x="1549400" y="6356350"/>
+            <a:ext cx="763200" cy="352800"/>
+          </a:xfrm>
+          <a:prstGeom prst="rect">
+            <a:avLst/>
+          </a:prstGeom>
+        </p:spPr>
+        <p:txBody>
+          <a:bodyPr spcFirstLastPara="1" wrap="square" lIns="36000" tIns="72000" rIns="91425" bIns="0" anchor="t" anchorCtr="0">
+            <a:noAutofit/>
+          </a:bodyPr>
+          <a:lstStyle/>
+          <a:p>
+            <a:pPr marL="0" lvl="0" indent="0" algn="l" rtl="0">
+              <a:spcBef>
+                <a:spcPts val="0"/>
+              </a:spcBef>
+              <a:spcAft>
+                <a:spcPts val="600"/>
+              </a:spcAft>
+              <a:buNone/>
+            </a:pPr>
+            <a:endParaRPr/>
+          </a:p>
+        </p:txBody>
+      </p:sp>
+      <p:sp>
+        <p:nvSpPr>
+          <p:cNvPr id="184" name="Google Shape;184;g71d64f1754_0_16"/>
+          <p:cNvSpPr txBox="1">
+            <a:spLocks noGrp="1"/>
+          </p:cNvSpPr>
+          <p:nvPr>
+            <p:ph type="sldNum" idx="12"/>
+          </p:nvPr>
+        </p:nvSpPr>
+        <p:spPr>
+          <a:xfrm>
+            <a:off x="8087836" y="6395540"/>
+            <a:ext cx="514500" cy="365100"/>
+          </a:xfrm>
+          <a:prstGeom prst="rect">
+            <a:avLst/>
+          </a:prstGeom>
+        </p:spPr>
+        <p:txBody>
+          <a:bodyPr spcFirstLastPara="1" wrap="square" lIns="91425" tIns="45700" rIns="91425" bIns="45700" anchor="ctr" anchorCtr="0">
+            <a:noAutofit/>
+          </a:bodyPr>
+          <a:lstStyle/>
+          <a:p>
+            <a:pPr marL="0" lvl="0" indent="0" algn="r" rtl="0">
+              <a:spcBef>
+                <a:spcPts val="0"/>
+              </a:spcBef>
+              <a:spcAft>
+                <a:spcPts val="0"/>
+              </a:spcAft>
+              <a:buNone/>
+            </a:pPr>
+            <a:fld id="{00000000-1234-1234-1234-123412341234}" type="slidenum">
+              <a:rPr lang="de-AT"/>
+              <a:t>10</a:t>
+            </a:fld>
+            <a:endParaRPr/>
+          </a:p>
+        </p:txBody>
+      </p:sp>
+      <p:sp>
+        <p:nvSpPr>
+          <p:cNvPr id="185" name="Google Shape;185;g71d64f1754_0_16"/>
+          <p:cNvSpPr txBox="1">
+            <a:spLocks noGrp="1"/>
+          </p:cNvSpPr>
+          <p:nvPr>
+            <p:ph type="body" idx="3"/>
+          </p:nvPr>
+        </p:nvSpPr>
+        <p:spPr>
+          <a:xfrm>
+            <a:off x="548268" y="1777395"/>
+            <a:ext cx="7925400" cy="4149900"/>
+          </a:xfrm>
+          <a:prstGeom prst="rect">
+            <a:avLst/>
+          </a:prstGeom>
+        </p:spPr>
+        <p:txBody>
+          <a:bodyPr spcFirstLastPara="1" wrap="square" lIns="91425" tIns="45700" rIns="91425" bIns="45700" anchor="t" anchorCtr="0">
+            <a:noAutofit/>
+          </a:bodyPr>
+          <a:lstStyle/>
+          <a:p>
+            <a:pPr marL="457200" lvl="0" indent="-387350" algn="l" rtl="0">
+              <a:spcBef>
+                <a:spcPts val="0"/>
+              </a:spcBef>
+              <a:spcAft>
+                <a:spcPts val="0"/>
+              </a:spcAft>
+              <a:buSzPts val="2500"/>
+              <a:buChar char="⬛"/>
+            </a:pPr>
+            <a:r>
+              <a:rPr lang="en-US" sz="2500" b="1" dirty="0"/>
+              <a:t>Mandatory: </a:t>
+            </a:r>
+            <a:r>
+              <a:rPr lang="en-US" sz="2500" i="1" dirty="0"/>
+              <a:t>Distribution of tasks</a:t>
+            </a:r>
+          </a:p>
+          <a:p>
+            <a:pPr lvl="1" indent="-387350">
+              <a:spcBef>
+                <a:spcPts val="0"/>
+              </a:spcBef>
+              <a:buSzPts val="2500"/>
+              <a:buChar char="⬛"/>
+            </a:pPr>
+            <a:r>
+              <a:rPr lang="en-US" sz="2300" i="1" dirty="0"/>
+              <a:t>Which person was working on which parts, and how much effort was put into these parts?</a:t>
+            </a:r>
+          </a:p>
+          <a:p>
+            <a:pPr lvl="1" indent="-387350">
+              <a:spcBef>
+                <a:spcPts val="0"/>
+              </a:spcBef>
+              <a:buSzPts val="2500"/>
+              <a:buChar char="⬛"/>
+            </a:pPr>
+            <a:r>
+              <a:rPr lang="en-US" sz="2300" i="1" dirty="0"/>
+              <a:t>This is your chance to show us that everyone is contributing to each part of the software (project requirement)</a:t>
+            </a:r>
+          </a:p>
+          <a:p>
+            <a:pPr marL="0" lvl="0" indent="0" algn="l" rtl="0">
+              <a:spcBef>
+                <a:spcPts val="600"/>
+              </a:spcBef>
+              <a:spcAft>
+                <a:spcPts val="0"/>
+              </a:spcAft>
+              <a:buNone/>
+            </a:pPr>
+            <a:endParaRPr lang="en-US" sz="2500" i="1" dirty="0"/>
+          </a:p>
+        </p:txBody>
+      </p:sp>
+    </p:spTree>
+    <p:extLst>
+      <p:ext uri="{BB962C8B-B14F-4D97-AF65-F5344CB8AC3E}">
+        <p14:creationId xmlns:p14="http://schemas.microsoft.com/office/powerpoint/2010/main" val="686943970"/>
+      </p:ext>
+    </p:extLst>
+  </p:cSld>
+  <p:clrMapOvr>
+    <a:masterClrMapping/>
+  </p:clrMapOvr>
+</p:sld>
+</file>
+
+<file path=ppt/slides/slide11.xml><?xml version="1.0" encoding="utf-8"?>
+<p:sld xmlns:a="http://schemas.openxmlformats.org/drawingml/2006/main" xmlns:r="http://schemas.openxmlformats.org/officeDocument/2006/relationships" xmlns:p="http://schemas.openxmlformats.org/presentationml/2006/main">
+  <p:cSld>
+    <p:spTree>
+      <p:nvGrpSpPr>
+        <p:cNvPr id="1" name="Shape 190"/>
+        <p:cNvGrpSpPr/>
+        <p:nvPr/>
+      </p:nvGrpSpPr>
+      <p:grpSpPr>
+        <a:xfrm>
+          <a:off x="0" y="0"/>
+          <a:ext cx="0" cy="0"/>
+          <a:chOff x="0" y="0"/>
+          <a:chExt cx="0" cy="0"/>
+        </a:xfrm>
+      </p:grpSpPr>
+      <p:sp>
+        <p:nvSpPr>
+          <p:cNvPr id="191" name="Google Shape;191;g71d64f1754_0_25"/>
+          <p:cNvSpPr txBox="1">
+            <a:spLocks noGrp="1"/>
+          </p:cNvSpPr>
+          <p:nvPr>
+            <p:ph type="body" idx="1"/>
+          </p:nvPr>
+        </p:nvSpPr>
+        <p:spPr>
+          <a:xfrm>
+            <a:off x="548268" y="5927411"/>
+            <a:ext cx="7925400" cy="278700"/>
+          </a:xfrm>
+          <a:prstGeom prst="rect">
+            <a:avLst/>
+          </a:prstGeom>
+        </p:spPr>
+        <p:txBody>
+          <a:bodyPr spcFirstLastPara="1" wrap="square" lIns="91425" tIns="45700" rIns="91425" bIns="45700" anchor="b" anchorCtr="0">
+            <a:noAutofit/>
+          </a:bodyPr>
+          <a:lstStyle/>
+          <a:p>
+            <a:pPr marL="0" lvl="0" indent="0" algn="l" rtl="0">
+              <a:spcBef>
+                <a:spcPts val="0"/>
+              </a:spcBef>
+              <a:spcAft>
+                <a:spcPts val="600"/>
+              </a:spcAft>
+              <a:buNone/>
+            </a:pPr>
+            <a:endParaRPr/>
+          </a:p>
+        </p:txBody>
+      </p:sp>
+      <p:sp>
+        <p:nvSpPr>
+          <p:cNvPr id="192" name="Google Shape;192;g71d64f1754_0_25"/>
+          <p:cNvSpPr txBox="1">
+            <a:spLocks noGrp="1"/>
+          </p:cNvSpPr>
+          <p:nvPr>
+            <p:ph type="title"/>
+          </p:nvPr>
+        </p:nvSpPr>
+        <p:spPr>
+          <a:xfrm>
+            <a:off x="549322" y="651700"/>
+            <a:ext cx="7938300" cy="938700"/>
+          </a:xfrm>
+          <a:prstGeom prst="rect">
+            <a:avLst/>
+          </a:prstGeom>
+        </p:spPr>
+        <p:txBody>
+          <a:bodyPr spcFirstLastPara="1" wrap="square" lIns="91425" tIns="45700" rIns="91425" bIns="45700" anchor="t" anchorCtr="0">
+            <a:noAutofit/>
+          </a:bodyPr>
+          <a:lstStyle/>
+          <a:p>
+            <a:pPr marL="0" lvl="0" indent="0" algn="l" rtl="0">
+              <a:spcBef>
+                <a:spcPts val="0"/>
+              </a:spcBef>
+              <a:spcAft>
+                <a:spcPts val="0"/>
+              </a:spcAft>
+              <a:buNone/>
+            </a:pPr>
+            <a:r>
+              <a:rPr lang="en-US" dirty="0"/>
+              <a:t>Problems in Release 2</a:t>
+            </a:r>
+          </a:p>
+        </p:txBody>
+      </p:sp>
+      <p:sp>
+        <p:nvSpPr>
+          <p:cNvPr id="193" name="Google Shape;193;g71d64f1754_0_25"/>
+          <p:cNvSpPr>
+            <a:spLocks noGrp="1"/>
+          </p:cNvSpPr>
+          <p:nvPr>
+            <p:ph type="pic" idx="2"/>
+          </p:nvPr>
+        </p:nvSpPr>
+        <p:spPr>
+          <a:xfrm>
+            <a:off x="1549400" y="6356350"/>
+            <a:ext cx="763200" cy="352800"/>
+          </a:xfrm>
+          <a:prstGeom prst="rect">
+            <a:avLst/>
+          </a:prstGeom>
+        </p:spPr>
+        <p:txBody>
+          <a:bodyPr spcFirstLastPara="1" wrap="square" lIns="36000" tIns="72000" rIns="91425" bIns="0" anchor="t" anchorCtr="0">
+            <a:noAutofit/>
+          </a:bodyPr>
+          <a:lstStyle/>
+          <a:p>
+            <a:pPr marL="0" lvl="0" indent="0" algn="l" rtl="0">
+              <a:spcBef>
+                <a:spcPts val="0"/>
+              </a:spcBef>
+              <a:spcAft>
+                <a:spcPts val="600"/>
+              </a:spcAft>
+              <a:buNone/>
+            </a:pPr>
+            <a:endParaRPr/>
+          </a:p>
+        </p:txBody>
+      </p:sp>
+      <p:sp>
+        <p:nvSpPr>
+          <p:cNvPr id="194" name="Google Shape;194;g71d64f1754_0_25"/>
+          <p:cNvSpPr txBox="1">
+            <a:spLocks noGrp="1"/>
+          </p:cNvSpPr>
+          <p:nvPr>
+            <p:ph type="sldNum" idx="12"/>
+          </p:nvPr>
+        </p:nvSpPr>
+        <p:spPr>
+          <a:xfrm>
+            <a:off x="8087836" y="6395540"/>
+            <a:ext cx="514500" cy="365100"/>
+          </a:xfrm>
+          <a:prstGeom prst="rect">
+            <a:avLst/>
+          </a:prstGeom>
+        </p:spPr>
+        <p:txBody>
+          <a:bodyPr spcFirstLastPara="1" wrap="square" lIns="91425" tIns="45700" rIns="91425" bIns="45700" anchor="ctr" anchorCtr="0">
+            <a:noAutofit/>
+          </a:bodyPr>
+          <a:lstStyle/>
+          <a:p>
+            <a:pPr marL="0" lvl="0" indent="0" algn="r" rtl="0">
+              <a:spcBef>
+                <a:spcPts val="0"/>
+              </a:spcBef>
+              <a:spcAft>
+                <a:spcPts val="0"/>
+              </a:spcAft>
+              <a:buNone/>
+            </a:pPr>
+            <a:fld id="{00000000-1234-1234-1234-123412341234}" type="slidenum">
+              <a:rPr lang="de-AT"/>
+              <a:t>11</a:t>
+            </a:fld>
+            <a:endParaRPr/>
+          </a:p>
+        </p:txBody>
+      </p:sp>
+      <p:sp>
+        <p:nvSpPr>
+          <p:cNvPr id="195" name="Google Shape;195;g71d64f1754_0_25"/>
+          <p:cNvSpPr txBox="1">
+            <a:spLocks noGrp="1"/>
+          </p:cNvSpPr>
+          <p:nvPr>
+            <p:ph type="body" idx="3"/>
+          </p:nvPr>
+        </p:nvSpPr>
+        <p:spPr>
+          <a:xfrm>
+            <a:off x="548268" y="1777395"/>
+            <a:ext cx="7925400" cy="4149900"/>
+          </a:xfrm>
+          <a:prstGeom prst="rect">
+            <a:avLst/>
+          </a:prstGeom>
+        </p:spPr>
+        <p:txBody>
+          <a:bodyPr spcFirstLastPara="1" wrap="square" lIns="91425" tIns="45700" rIns="91425" bIns="45700" anchor="t" anchorCtr="0">
+            <a:noAutofit/>
+          </a:bodyPr>
+          <a:lstStyle/>
+          <a:p>
+            <a:pPr marL="457200" lvl="0" indent="-387350" algn="l" rtl="0">
+              <a:spcBef>
+                <a:spcPts val="600"/>
+              </a:spcBef>
+              <a:spcAft>
+                <a:spcPts val="0"/>
+              </a:spcAft>
+              <a:buSzPts val="2500"/>
+              <a:buChar char="⬛"/>
+            </a:pPr>
+            <a:r>
+              <a:rPr lang="en-US" sz="2500" i="1" dirty="0"/>
+              <a:t>Description of major problems (Planning, Implementation, </a:t>
+            </a:r>
+            <a:r>
+              <a:rPr lang="en-US" sz="2500" i="1" dirty="0" err="1"/>
+              <a:t>etc</a:t>
+            </a:r>
+            <a:r>
+              <a:rPr lang="en-US" sz="2500" i="1" dirty="0"/>
+              <a:t>…)</a:t>
+            </a:r>
+          </a:p>
+          <a:p>
+            <a:pPr marL="457200" lvl="0" indent="-387350" algn="l" rtl="0">
+              <a:spcBef>
+                <a:spcPts val="0"/>
+              </a:spcBef>
+              <a:spcAft>
+                <a:spcPts val="0"/>
+              </a:spcAft>
+              <a:buSzPts val="2500"/>
+              <a:buChar char="⬛"/>
+            </a:pPr>
+            <a:r>
+              <a:rPr lang="en-US" sz="2500" i="1" dirty="0"/>
+              <a:t>What did the team learn? (Lessons learned to be applied for the next release)</a:t>
+            </a:r>
+          </a:p>
+        </p:txBody>
+      </p:sp>
+    </p:spTree>
+  </p:cSld>
+  <p:clrMapOvr>
+    <a:masterClrMapping/>
+  </p:clrMapOvr>
+</p:sld>
+</file>
+
+<file path=ppt/slides/slide12.xml><?xml version="1.0" encoding="utf-8"?>
+<p:sld xmlns:a="http://schemas.openxmlformats.org/drawingml/2006/main" xmlns:r="http://schemas.openxmlformats.org/officeDocument/2006/relationships" xmlns:p="http://schemas.openxmlformats.org/presentationml/2006/main">
+  <p:cSld>
+    <p:spTree>
+      <p:nvGrpSpPr>
+        <p:cNvPr id="1" name="Shape 200"/>
+        <p:cNvGrpSpPr/>
+        <p:nvPr/>
+      </p:nvGrpSpPr>
+      <p:grpSpPr>
+        <a:xfrm>
+          <a:off x="0" y="0"/>
+          <a:ext cx="0" cy="0"/>
+          <a:chOff x="0" y="0"/>
+          <a:chExt cx="0" cy="0"/>
+        </a:xfrm>
+      </p:grpSpPr>
+      <p:sp>
+        <p:nvSpPr>
+          <p:cNvPr id="201" name="Google Shape;201;g71d64f1754_0_52"/>
+          <p:cNvSpPr txBox="1">
+            <a:spLocks noGrp="1"/>
+          </p:cNvSpPr>
+          <p:nvPr>
+            <p:ph type="body" idx="1"/>
+          </p:nvPr>
+        </p:nvSpPr>
+        <p:spPr>
+          <a:xfrm>
+            <a:off x="548268" y="5927411"/>
+            <a:ext cx="7925400" cy="278700"/>
+          </a:xfrm>
+          <a:prstGeom prst="rect">
+            <a:avLst/>
+          </a:prstGeom>
+        </p:spPr>
+        <p:txBody>
+          <a:bodyPr spcFirstLastPara="1" wrap="square" lIns="91425" tIns="45700" rIns="91425" bIns="45700" anchor="b" anchorCtr="0">
+            <a:noAutofit/>
+          </a:bodyPr>
+          <a:lstStyle/>
+          <a:p>
+            <a:pPr marL="0" lvl="0" indent="0" algn="l" rtl="0">
+              <a:spcBef>
+                <a:spcPts val="0"/>
+              </a:spcBef>
+              <a:spcAft>
+                <a:spcPts val="600"/>
+              </a:spcAft>
+              <a:buNone/>
+            </a:pPr>
+            <a:endParaRPr/>
+          </a:p>
+        </p:txBody>
+      </p:sp>
+      <p:sp>
+        <p:nvSpPr>
+          <p:cNvPr id="202" name="Google Shape;202;g71d64f1754_0_52"/>
+          <p:cNvSpPr txBox="1">
+            <a:spLocks noGrp="1"/>
+          </p:cNvSpPr>
+          <p:nvPr>
+            <p:ph type="title"/>
+          </p:nvPr>
+        </p:nvSpPr>
+        <p:spPr>
+          <a:xfrm>
+            <a:off x="549325" y="651700"/>
+            <a:ext cx="8594700" cy="938700"/>
+          </a:xfrm>
+          <a:prstGeom prst="rect">
+            <a:avLst/>
+          </a:prstGeom>
+        </p:spPr>
+        <p:txBody>
+          <a:bodyPr spcFirstLastPara="1" wrap="square" lIns="91425" tIns="45700" rIns="91425" bIns="45700" anchor="t" anchorCtr="0">
+            <a:noAutofit/>
+          </a:bodyPr>
+          <a:lstStyle/>
+          <a:p>
+            <a:pPr marL="0" lvl="0" indent="0" algn="l" rtl="0">
+              <a:spcBef>
+                <a:spcPts val="0"/>
+              </a:spcBef>
+              <a:spcAft>
+                <a:spcPts val="0"/>
+              </a:spcAft>
+              <a:buNone/>
+            </a:pPr>
+            <a:r>
+              <a:rPr lang="en-US" dirty="0"/>
+              <a:t>Next Steps + Planning Release 3</a:t>
+            </a:r>
+          </a:p>
+        </p:txBody>
+      </p:sp>
+      <p:sp>
+        <p:nvSpPr>
+          <p:cNvPr id="203" name="Google Shape;203;g71d64f1754_0_52"/>
+          <p:cNvSpPr>
+            <a:spLocks noGrp="1"/>
+          </p:cNvSpPr>
+          <p:nvPr>
+            <p:ph type="pic" idx="2"/>
+          </p:nvPr>
+        </p:nvSpPr>
+        <p:spPr>
+          <a:xfrm>
+            <a:off x="1549400" y="6356350"/>
+            <a:ext cx="763200" cy="352800"/>
+          </a:xfrm>
+          <a:prstGeom prst="rect">
+            <a:avLst/>
+          </a:prstGeom>
+        </p:spPr>
+        <p:txBody>
+          <a:bodyPr spcFirstLastPara="1" wrap="square" lIns="36000" tIns="72000" rIns="91425" bIns="0" anchor="t" anchorCtr="0">
+            <a:noAutofit/>
+          </a:bodyPr>
+          <a:lstStyle/>
+          <a:p>
+            <a:pPr marL="0" lvl="0" indent="0" algn="l" rtl="0">
+              <a:spcBef>
+                <a:spcPts val="0"/>
+              </a:spcBef>
+              <a:spcAft>
+                <a:spcPts val="600"/>
+              </a:spcAft>
+              <a:buNone/>
+            </a:pPr>
+            <a:endParaRPr/>
+          </a:p>
+        </p:txBody>
+      </p:sp>
+      <p:sp>
+        <p:nvSpPr>
+          <p:cNvPr id="204" name="Google Shape;204;g71d64f1754_0_52"/>
+          <p:cNvSpPr txBox="1">
+            <a:spLocks noGrp="1"/>
+          </p:cNvSpPr>
+          <p:nvPr>
+            <p:ph type="sldNum" idx="12"/>
+          </p:nvPr>
+        </p:nvSpPr>
+        <p:spPr>
+          <a:xfrm>
+            <a:off x="8087836" y="6395540"/>
+            <a:ext cx="514500" cy="365100"/>
+          </a:xfrm>
+          <a:prstGeom prst="rect">
+            <a:avLst/>
+          </a:prstGeom>
+        </p:spPr>
+        <p:txBody>
+          <a:bodyPr spcFirstLastPara="1" wrap="square" lIns="91425" tIns="45700" rIns="91425" bIns="45700" anchor="ctr" anchorCtr="0">
+            <a:noAutofit/>
+          </a:bodyPr>
+          <a:lstStyle/>
+          <a:p>
+            <a:pPr marL="0" lvl="0" indent="0" algn="r" rtl="0">
+              <a:spcBef>
+                <a:spcPts val="0"/>
+              </a:spcBef>
+              <a:spcAft>
+                <a:spcPts val="0"/>
+              </a:spcAft>
+              <a:buNone/>
+            </a:pPr>
+            <a:fld id="{00000000-1234-1234-1234-123412341234}" type="slidenum">
+              <a:rPr lang="de-AT"/>
+              <a:t>12</a:t>
+            </a:fld>
+            <a:endParaRPr/>
+          </a:p>
+        </p:txBody>
+      </p:sp>
+      <p:sp>
+        <p:nvSpPr>
+          <p:cNvPr id="205" name="Google Shape;205;g71d64f1754_0_52"/>
+          <p:cNvSpPr txBox="1">
+            <a:spLocks noGrp="1"/>
+          </p:cNvSpPr>
+          <p:nvPr>
+            <p:ph type="body" idx="3"/>
+          </p:nvPr>
+        </p:nvSpPr>
+        <p:spPr>
+          <a:xfrm>
+            <a:off x="548268" y="1777395"/>
+            <a:ext cx="7925400" cy="4149900"/>
+          </a:xfrm>
+          <a:prstGeom prst="rect">
+            <a:avLst/>
+          </a:prstGeom>
+        </p:spPr>
+        <p:txBody>
+          <a:bodyPr spcFirstLastPara="1" wrap="square" lIns="91425" tIns="45700" rIns="91425" bIns="45700" anchor="t" anchorCtr="0">
+            <a:noAutofit/>
+          </a:bodyPr>
+          <a:lstStyle/>
+          <a:p>
+            <a:pPr marL="457200" lvl="0" indent="-387350" algn="l" rtl="0">
+              <a:spcBef>
+                <a:spcPts val="600"/>
+              </a:spcBef>
+              <a:spcAft>
+                <a:spcPts val="0"/>
+              </a:spcAft>
+              <a:buSzPts val="2500"/>
+              <a:buChar char="⬛"/>
+            </a:pPr>
+            <a:r>
+              <a:rPr lang="en-US" sz="2500" i="1" dirty="0"/>
+              <a:t>Brief overview of the further plan and next steps</a:t>
             </a:r>
           </a:p>
         </p:txBody>
@@ -23152,46 +24529,8 @@
             </a:pPr>
             <a:r>
               <a:rPr lang="en-US" dirty="0"/>
-              <a:t>Concepts</a:t>
+              <a:t>Agenda</a:t>
             </a:r>
-          </a:p>
-        </p:txBody>
-      </p:sp>
-      <p:sp>
-        <p:nvSpPr>
-          <p:cNvPr id="163" name="Google Shape;163;g71d64f1754_0_34"/>
-          <p:cNvSpPr>
-            <a:spLocks noGrp="1"/>
-          </p:cNvSpPr>
-          <p:nvPr>
-            <p:ph type="pic" idx="2"/>
-          </p:nvPr>
-        </p:nvSpPr>
-        <p:spPr>
-          <a:xfrm>
-            <a:off x="1549400" y="6356350"/>
-            <a:ext cx="763200" cy="352800"/>
-          </a:xfrm>
-          <a:prstGeom prst="rect">
-            <a:avLst/>
-          </a:prstGeom>
-        </p:spPr>
-        <p:txBody>
-          <a:bodyPr spcFirstLastPara="1" wrap="square" lIns="36000" tIns="72000" rIns="91425" bIns="0" anchor="t" anchorCtr="0">
-            <a:noAutofit/>
-          </a:bodyPr>
-          <a:lstStyle/>
-          <a:p>
-            <a:pPr marL="0" lvl="0" indent="0" algn="l" rtl="0">
-              <a:spcBef>
-                <a:spcPts val="0"/>
-              </a:spcBef>
-              <a:spcAft>
-                <a:spcPts val="600"/>
-              </a:spcAft>
-              <a:buNone/>
-            </a:pPr>
-            <a:endParaRPr/>
           </a:p>
         </p:txBody>
       </p:sp>
@@ -23249,7 +24588,7 @@
         </p:nvSpPr>
         <p:spPr>
           <a:xfrm>
-            <a:off x="548268" y="1777395"/>
+            <a:off x="548268" y="1354050"/>
             <a:ext cx="7925400" cy="4149900"/>
           </a:xfrm>
           <a:prstGeom prst="rect">
@@ -23273,13 +24612,318 @@
               <a:buChar char="⬛"/>
             </a:pPr>
             <a:r>
-              <a:rPr lang="en-US" sz="2400" dirty="0"/>
-              <a:t>Present the UML diagram here, and describe the changes you have done since the previous release</a:t>
+              <a:rPr lang="en-US" sz="2500" i="1" dirty="0"/>
+              <a:t>UML</a:t>
             </a:r>
+          </a:p>
+          <a:p>
+            <a:pPr lvl="1" indent="-387350">
+              <a:buSzPts val="2500"/>
+              <a:buChar char="⬛"/>
+            </a:pPr>
+            <a:r>
+              <a:rPr lang="en-US" sz="2800" i="1"/>
+              <a:t>UML (old)</a:t>
+            </a:r>
+            <a:endParaRPr lang="en-US" sz="2800" i="1" dirty="0"/>
+          </a:p>
+          <a:p>
+            <a:pPr lvl="1" indent="-387350">
+              <a:buSzPts val="2500"/>
+              <a:buChar char="⬛"/>
+            </a:pPr>
+            <a:r>
+              <a:rPr lang="en-US" sz="2800" i="1" dirty="0"/>
+              <a:t>Server-UML, Simulator-UML, Client-UML</a:t>
+            </a:r>
+          </a:p>
+          <a:p>
+            <a:pPr marL="457200" lvl="0" indent="-387350" algn="l" rtl="0">
+              <a:spcBef>
+                <a:spcPts val="600"/>
+              </a:spcBef>
+              <a:spcAft>
+                <a:spcPts val="0"/>
+              </a:spcAft>
+              <a:buSzPts val="2500"/>
+              <a:buChar char="⬛"/>
+            </a:pPr>
+            <a:r>
+              <a:rPr lang="en-US" sz="2500" i="1" dirty="0"/>
+              <a:t>Demo</a:t>
+            </a:r>
+          </a:p>
+          <a:p>
+            <a:pPr marL="457200" lvl="0" indent="-387350" algn="l" rtl="0">
+              <a:spcBef>
+                <a:spcPts val="600"/>
+              </a:spcBef>
+              <a:spcAft>
+                <a:spcPts val="0"/>
+              </a:spcAft>
+              <a:buSzPts val="2500"/>
+              <a:buChar char="⬛"/>
+            </a:pPr>
+            <a:r>
+              <a:rPr lang="en-US" sz="2500" i="1" dirty="0"/>
+              <a:t>Software Quality</a:t>
+            </a:r>
+          </a:p>
+          <a:p>
+            <a:pPr marL="457200" lvl="0" indent="-387350" algn="l" rtl="0">
+              <a:spcBef>
+                <a:spcPts val="600"/>
+              </a:spcBef>
+              <a:spcAft>
+                <a:spcPts val="0"/>
+              </a:spcAft>
+              <a:buSzPts val="2500"/>
+              <a:buChar char="⬛"/>
+            </a:pPr>
+            <a:r>
+              <a:rPr lang="en-US" sz="2500" i="1" dirty="0"/>
+              <a:t>Current Status + progress in Release 2</a:t>
+            </a:r>
+          </a:p>
+          <a:p>
+            <a:pPr marL="457200" lvl="0" indent="-387350" algn="l" rtl="0">
+              <a:spcBef>
+                <a:spcPts val="600"/>
+              </a:spcBef>
+              <a:spcAft>
+                <a:spcPts val="0"/>
+              </a:spcAft>
+              <a:buSzPts val="2500"/>
+              <a:buChar char="⬛"/>
+            </a:pPr>
+            <a:r>
+              <a:rPr lang="en-US" sz="2500" i="1" dirty="0"/>
+              <a:t>Problems in Release 2</a:t>
+            </a:r>
+          </a:p>
+          <a:p>
+            <a:pPr marL="457200" lvl="0" indent="-387350" algn="l" rtl="0">
+              <a:spcBef>
+                <a:spcPts val="600"/>
+              </a:spcBef>
+              <a:spcAft>
+                <a:spcPts val="0"/>
+              </a:spcAft>
+              <a:buSzPts val="2500"/>
+              <a:buChar char="⬛"/>
+            </a:pPr>
+            <a:r>
+              <a:rPr lang="en-US" sz="2500" i="1" dirty="0"/>
+              <a:t>Next Steps + Planning Release 3</a:t>
+            </a:r>
+          </a:p>
+          <a:p>
+            <a:pPr marL="457200" lvl="0" indent="-387350" algn="l" rtl="0">
+              <a:spcBef>
+                <a:spcPts val="600"/>
+              </a:spcBef>
+              <a:spcAft>
+                <a:spcPts val="0"/>
+              </a:spcAft>
+              <a:buSzPts val="2500"/>
+              <a:buChar char="⬛"/>
+            </a:pPr>
+            <a:endParaRPr lang="en-US" sz="2500" i="1" dirty="0"/>
+          </a:p>
+          <a:p>
+            <a:pPr marL="457200" lvl="0" indent="-387350" algn="l" rtl="0">
+              <a:spcBef>
+                <a:spcPts val="600"/>
+              </a:spcBef>
+              <a:spcAft>
+                <a:spcPts val="0"/>
+              </a:spcAft>
+              <a:buSzPts val="2500"/>
+              <a:buChar char="⬛"/>
+            </a:pPr>
             <a:endParaRPr lang="en-US" sz="2500" i="1" dirty="0"/>
           </a:p>
         </p:txBody>
       </p:sp>
+      <p:sp>
+        <p:nvSpPr>
+          <p:cNvPr id="6" name="Bildplatzhalter 5">
+            <a:extLst>
+              <a:ext uri="{FF2B5EF4-FFF2-40B4-BE49-F238E27FC236}">
+                <a16:creationId xmlns:a16="http://schemas.microsoft.com/office/drawing/2014/main" id="{B0B13C8C-1DFB-6419-18BD-6500B24BE74E}"/>
+              </a:ext>
+            </a:extLst>
+          </p:cNvPr>
+          <p:cNvSpPr>
+            <a:spLocks noGrp="1"/>
+          </p:cNvSpPr>
+          <p:nvPr>
+            <p:ph type="pic" idx="2"/>
+          </p:nvPr>
+        </p:nvSpPr>
+        <p:spPr/>
+      </p:sp>
+    </p:spTree>
+    <p:extLst>
+      <p:ext uri="{BB962C8B-B14F-4D97-AF65-F5344CB8AC3E}">
+        <p14:creationId xmlns:p14="http://schemas.microsoft.com/office/powerpoint/2010/main" val="2809786274"/>
+      </p:ext>
+    </p:extLst>
+  </p:cSld>
+  <p:clrMapOvr>
+    <a:masterClrMapping/>
+  </p:clrMapOvr>
+</p:sld>
+</file>
+
+<file path=ppt/slides/slide3.xml><?xml version="1.0" encoding="utf-8"?>
+<p:sld xmlns:a="http://schemas.openxmlformats.org/drawingml/2006/main" xmlns:r="http://schemas.openxmlformats.org/officeDocument/2006/relationships" xmlns:p="http://schemas.openxmlformats.org/presentationml/2006/main">
+  <p:cSld>
+    <p:spTree>
+      <p:nvGrpSpPr>
+        <p:cNvPr id="1" name="Shape 160"/>
+        <p:cNvGrpSpPr/>
+        <p:nvPr/>
+      </p:nvGrpSpPr>
+      <p:grpSpPr>
+        <a:xfrm>
+          <a:off x="0" y="0"/>
+          <a:ext cx="0" cy="0"/>
+          <a:chOff x="0" y="0"/>
+          <a:chExt cx="0" cy="0"/>
+        </a:xfrm>
+      </p:grpSpPr>
+      <p:sp>
+        <p:nvSpPr>
+          <p:cNvPr id="162" name="Google Shape;162;g71d64f1754_0_34"/>
+          <p:cNvSpPr txBox="1">
+            <a:spLocks noGrp="1"/>
+          </p:cNvSpPr>
+          <p:nvPr>
+            <p:ph type="title"/>
+          </p:nvPr>
+        </p:nvSpPr>
+        <p:spPr>
+          <a:xfrm>
+            <a:off x="549322" y="651700"/>
+            <a:ext cx="7938300" cy="938700"/>
+          </a:xfrm>
+          <a:prstGeom prst="rect">
+            <a:avLst/>
+          </a:prstGeom>
+        </p:spPr>
+        <p:txBody>
+          <a:bodyPr spcFirstLastPara="1" wrap="square" lIns="91425" tIns="45700" rIns="91425" bIns="45700" anchor="t" anchorCtr="0">
+            <a:noAutofit/>
+          </a:bodyPr>
+          <a:lstStyle/>
+          <a:p>
+            <a:pPr marL="0" lvl="0" indent="0" algn="l" rtl="0">
+              <a:spcBef>
+                <a:spcPts val="0"/>
+              </a:spcBef>
+              <a:spcAft>
+                <a:spcPts val="0"/>
+              </a:spcAft>
+              <a:buNone/>
+            </a:pPr>
+            <a:r>
+              <a:rPr lang="en-US" dirty="0"/>
+              <a:t>UML (old)</a:t>
+            </a:r>
+          </a:p>
+        </p:txBody>
+      </p:sp>
+      <p:sp>
+        <p:nvSpPr>
+          <p:cNvPr id="164" name="Google Shape;164;g71d64f1754_0_34"/>
+          <p:cNvSpPr txBox="1">
+            <a:spLocks noGrp="1"/>
+          </p:cNvSpPr>
+          <p:nvPr>
+            <p:ph type="sldNum" idx="12"/>
+          </p:nvPr>
+        </p:nvSpPr>
+        <p:spPr>
+          <a:xfrm>
+            <a:off x="8087836" y="6395540"/>
+            <a:ext cx="514500" cy="365100"/>
+          </a:xfrm>
+          <a:prstGeom prst="rect">
+            <a:avLst/>
+          </a:prstGeom>
+        </p:spPr>
+        <p:txBody>
+          <a:bodyPr spcFirstLastPara="1" wrap="square" lIns="91425" tIns="45700" rIns="91425" bIns="45700" anchor="ctr" anchorCtr="0">
+            <a:noAutofit/>
+          </a:bodyPr>
+          <a:lstStyle/>
+          <a:p>
+            <a:pPr marL="0" lvl="0" indent="0" algn="r" rtl="0">
+              <a:spcBef>
+                <a:spcPts val="0"/>
+              </a:spcBef>
+              <a:spcAft>
+                <a:spcPts val="0"/>
+              </a:spcAft>
+              <a:buNone/>
+            </a:pPr>
+            <a:fld id="{00000000-1234-1234-1234-123412341234}" type="slidenum">
+              <a:rPr lang="de-AT"/>
+              <a:t>3</a:t>
+            </a:fld>
+            <a:endParaRPr/>
+          </a:p>
+        </p:txBody>
+      </p:sp>
+      <p:sp>
+        <p:nvSpPr>
+          <p:cNvPr id="18" name="Bildplatzhalter 17">
+            <a:extLst>
+              <a:ext uri="{FF2B5EF4-FFF2-40B4-BE49-F238E27FC236}">
+                <a16:creationId xmlns:a16="http://schemas.microsoft.com/office/drawing/2014/main" id="{E33B077B-9A08-7147-42C5-392ACF86180C}"/>
+              </a:ext>
+            </a:extLst>
+          </p:cNvPr>
+          <p:cNvSpPr>
+            <a:spLocks noGrp="1"/>
+          </p:cNvSpPr>
+          <p:nvPr>
+            <p:ph type="pic" idx="2"/>
+          </p:nvPr>
+        </p:nvSpPr>
+        <p:spPr/>
+      </p:sp>
+      <p:pic>
+        <p:nvPicPr>
+          <p:cNvPr id="20" name="Grafik 19">
+            <a:extLst>
+              <a:ext uri="{FF2B5EF4-FFF2-40B4-BE49-F238E27FC236}">
+                <a16:creationId xmlns:a16="http://schemas.microsoft.com/office/drawing/2014/main" id="{87A9883C-4D8A-7D1D-3E81-80374D7CDD8E}"/>
+              </a:ext>
+            </a:extLst>
+          </p:cNvPr>
+          <p:cNvPicPr>
+            <a:picLocks noChangeAspect="1"/>
+          </p:cNvPicPr>
+          <p:nvPr/>
+        </p:nvPicPr>
+        <p:blipFill>
+          <a:blip r:embed="rId3"/>
+          <a:stretch>
+            <a:fillRect/>
+          </a:stretch>
+        </p:blipFill>
+        <p:spPr>
+          <a:xfrm>
+            <a:off x="962329" y="1229101"/>
+            <a:ext cx="7112285" cy="4656758"/>
+          </a:xfrm>
+          <a:prstGeom prst="rect">
+            <a:avLst/>
+          </a:prstGeom>
+        </p:spPr>
+      </p:pic>
     </p:spTree>
   </p:cSld>
   <p:clrMapOvr>
@@ -23288,7 +24932,472 @@
 </p:sld>
 </file>
 
-<file path=ppt/slides/slide3.xml><?xml version="1.0" encoding="utf-8"?>
+<file path=ppt/slides/slide4.xml><?xml version="1.0" encoding="utf-8"?>
+<p:sld xmlns:a="http://schemas.openxmlformats.org/drawingml/2006/main" xmlns:r="http://schemas.openxmlformats.org/officeDocument/2006/relationships" xmlns:p="http://schemas.openxmlformats.org/presentationml/2006/main">
+  <p:cSld>
+    <p:spTree>
+      <p:nvGrpSpPr>
+        <p:cNvPr id="1" name="Shape 160"/>
+        <p:cNvGrpSpPr/>
+        <p:nvPr/>
+      </p:nvGrpSpPr>
+      <p:grpSpPr>
+        <a:xfrm>
+          <a:off x="0" y="0"/>
+          <a:ext cx="0" cy="0"/>
+          <a:chOff x="0" y="0"/>
+          <a:chExt cx="0" cy="0"/>
+        </a:xfrm>
+      </p:grpSpPr>
+      <p:sp>
+        <p:nvSpPr>
+          <p:cNvPr id="162" name="Google Shape;162;g71d64f1754_0_34"/>
+          <p:cNvSpPr txBox="1">
+            <a:spLocks noGrp="1"/>
+          </p:cNvSpPr>
+          <p:nvPr>
+            <p:ph type="title"/>
+          </p:nvPr>
+        </p:nvSpPr>
+        <p:spPr>
+          <a:xfrm>
+            <a:off x="549322" y="651700"/>
+            <a:ext cx="7938300" cy="938700"/>
+          </a:xfrm>
+          <a:prstGeom prst="rect">
+            <a:avLst/>
+          </a:prstGeom>
+        </p:spPr>
+        <p:txBody>
+          <a:bodyPr spcFirstLastPara="1" wrap="square" lIns="91425" tIns="45700" rIns="91425" bIns="45700" anchor="t" anchorCtr="0">
+            <a:noAutofit/>
+          </a:bodyPr>
+          <a:lstStyle/>
+          <a:p>
+            <a:pPr marL="0" lvl="0" indent="0" algn="l" rtl="0">
+              <a:spcBef>
+                <a:spcPts val="0"/>
+              </a:spcBef>
+              <a:spcAft>
+                <a:spcPts val="0"/>
+              </a:spcAft>
+              <a:buNone/>
+            </a:pPr>
+            <a:r>
+              <a:rPr lang="en-US" dirty="0"/>
+              <a:t>Server - UML</a:t>
+            </a:r>
+          </a:p>
+        </p:txBody>
+      </p:sp>
+      <p:sp>
+        <p:nvSpPr>
+          <p:cNvPr id="164" name="Google Shape;164;g71d64f1754_0_34"/>
+          <p:cNvSpPr txBox="1">
+            <a:spLocks noGrp="1"/>
+          </p:cNvSpPr>
+          <p:nvPr>
+            <p:ph type="sldNum" idx="12"/>
+          </p:nvPr>
+        </p:nvSpPr>
+        <p:spPr>
+          <a:xfrm>
+            <a:off x="8087836" y="6395540"/>
+            <a:ext cx="514500" cy="365100"/>
+          </a:xfrm>
+          <a:prstGeom prst="rect">
+            <a:avLst/>
+          </a:prstGeom>
+        </p:spPr>
+        <p:txBody>
+          <a:bodyPr spcFirstLastPara="1" wrap="square" lIns="91425" tIns="45700" rIns="91425" bIns="45700" anchor="ctr" anchorCtr="0">
+            <a:noAutofit/>
+          </a:bodyPr>
+          <a:lstStyle/>
+          <a:p>
+            <a:pPr marL="0" lvl="0" indent="0" algn="r" rtl="0">
+              <a:spcBef>
+                <a:spcPts val="0"/>
+              </a:spcBef>
+              <a:spcAft>
+                <a:spcPts val="0"/>
+              </a:spcAft>
+              <a:buNone/>
+            </a:pPr>
+            <a:fld id="{00000000-1234-1234-1234-123412341234}" type="slidenum">
+              <a:rPr lang="de-AT"/>
+              <a:t>4</a:t>
+            </a:fld>
+            <a:endParaRPr/>
+          </a:p>
+        </p:txBody>
+      </p:sp>
+      <p:pic>
+        <p:nvPicPr>
+          <p:cNvPr id="7" name="Grafik 6">
+            <a:extLst>
+              <a:ext uri="{FF2B5EF4-FFF2-40B4-BE49-F238E27FC236}">
+                <a16:creationId xmlns:a16="http://schemas.microsoft.com/office/drawing/2014/main" id="{5E3B4A43-15FE-EAA4-0BA7-F021D888BEE7}"/>
+              </a:ext>
+            </a:extLst>
+          </p:cNvPr>
+          <p:cNvPicPr>
+            <a:picLocks noChangeAspect="1"/>
+          </p:cNvPicPr>
+          <p:nvPr/>
+        </p:nvPicPr>
+        <p:blipFill>
+          <a:blip r:embed="rId3"/>
+          <a:stretch>
+            <a:fillRect/>
+          </a:stretch>
+        </p:blipFill>
+        <p:spPr>
+          <a:xfrm>
+            <a:off x="2077374" y="1186305"/>
+            <a:ext cx="4989251" cy="5087615"/>
+          </a:xfrm>
+          <a:prstGeom prst="rect">
+            <a:avLst/>
+          </a:prstGeom>
+        </p:spPr>
+      </p:pic>
+    </p:spTree>
+    <p:extLst>
+      <p:ext uri="{BB962C8B-B14F-4D97-AF65-F5344CB8AC3E}">
+        <p14:creationId xmlns:p14="http://schemas.microsoft.com/office/powerpoint/2010/main" val="372630323"/>
+      </p:ext>
+    </p:extLst>
+  </p:cSld>
+  <p:clrMapOvr>
+    <a:masterClrMapping/>
+  </p:clrMapOvr>
+</p:sld>
+</file>
+
+<file path=ppt/slides/slide5.xml><?xml version="1.0" encoding="utf-8"?>
+<p:sld xmlns:a="http://schemas.openxmlformats.org/drawingml/2006/main" xmlns:r="http://schemas.openxmlformats.org/officeDocument/2006/relationships" xmlns:p="http://schemas.openxmlformats.org/presentationml/2006/main">
+  <p:cSld>
+    <p:spTree>
+      <p:nvGrpSpPr>
+        <p:cNvPr id="1" name="Shape 160"/>
+        <p:cNvGrpSpPr/>
+        <p:nvPr/>
+      </p:nvGrpSpPr>
+      <p:grpSpPr>
+        <a:xfrm>
+          <a:off x="0" y="0"/>
+          <a:ext cx="0" cy="0"/>
+          <a:chOff x="0" y="0"/>
+          <a:chExt cx="0" cy="0"/>
+        </a:xfrm>
+      </p:grpSpPr>
+      <p:sp>
+        <p:nvSpPr>
+          <p:cNvPr id="162" name="Google Shape;162;g71d64f1754_0_34"/>
+          <p:cNvSpPr txBox="1">
+            <a:spLocks noGrp="1"/>
+          </p:cNvSpPr>
+          <p:nvPr>
+            <p:ph type="title"/>
+          </p:nvPr>
+        </p:nvSpPr>
+        <p:spPr>
+          <a:xfrm>
+            <a:off x="549322" y="651700"/>
+            <a:ext cx="7938300" cy="938700"/>
+          </a:xfrm>
+          <a:prstGeom prst="rect">
+            <a:avLst/>
+          </a:prstGeom>
+        </p:spPr>
+        <p:txBody>
+          <a:bodyPr spcFirstLastPara="1" wrap="square" lIns="91425" tIns="45700" rIns="91425" bIns="45700" anchor="t" anchorCtr="0">
+            <a:noAutofit/>
+          </a:bodyPr>
+          <a:lstStyle/>
+          <a:p>
+            <a:pPr marL="0" lvl="0" indent="0" algn="l" rtl="0">
+              <a:spcBef>
+                <a:spcPts val="0"/>
+              </a:spcBef>
+              <a:spcAft>
+                <a:spcPts val="0"/>
+              </a:spcAft>
+              <a:buNone/>
+            </a:pPr>
+            <a:r>
+              <a:rPr lang="en-US" dirty="0"/>
+              <a:t>Simulator - UML</a:t>
+            </a:r>
+          </a:p>
+        </p:txBody>
+      </p:sp>
+      <p:sp>
+        <p:nvSpPr>
+          <p:cNvPr id="164" name="Google Shape;164;g71d64f1754_0_34"/>
+          <p:cNvSpPr txBox="1">
+            <a:spLocks noGrp="1"/>
+          </p:cNvSpPr>
+          <p:nvPr>
+            <p:ph type="sldNum" idx="12"/>
+          </p:nvPr>
+        </p:nvSpPr>
+        <p:spPr>
+          <a:xfrm>
+            <a:off x="8087836" y="6395540"/>
+            <a:ext cx="514500" cy="365100"/>
+          </a:xfrm>
+          <a:prstGeom prst="rect">
+            <a:avLst/>
+          </a:prstGeom>
+        </p:spPr>
+        <p:txBody>
+          <a:bodyPr spcFirstLastPara="1" wrap="square" lIns="91425" tIns="45700" rIns="91425" bIns="45700" anchor="ctr" anchorCtr="0">
+            <a:noAutofit/>
+          </a:bodyPr>
+          <a:lstStyle/>
+          <a:p>
+            <a:pPr marL="0" lvl="0" indent="0" algn="r" rtl="0">
+              <a:spcBef>
+                <a:spcPts val="0"/>
+              </a:spcBef>
+              <a:spcAft>
+                <a:spcPts val="0"/>
+              </a:spcAft>
+              <a:buNone/>
+            </a:pPr>
+            <a:fld id="{00000000-1234-1234-1234-123412341234}" type="slidenum">
+              <a:rPr lang="de-AT"/>
+              <a:t>5</a:t>
+            </a:fld>
+            <a:endParaRPr/>
+          </a:p>
+        </p:txBody>
+      </p:sp>
+      <p:sp>
+        <p:nvSpPr>
+          <p:cNvPr id="18" name="Bildplatzhalter 17">
+            <a:extLst>
+              <a:ext uri="{FF2B5EF4-FFF2-40B4-BE49-F238E27FC236}">
+                <a16:creationId xmlns:a16="http://schemas.microsoft.com/office/drawing/2014/main" id="{E33B077B-9A08-7147-42C5-392ACF86180C}"/>
+              </a:ext>
+            </a:extLst>
+          </p:cNvPr>
+          <p:cNvSpPr>
+            <a:spLocks noGrp="1"/>
+          </p:cNvSpPr>
+          <p:nvPr>
+            <p:ph type="pic" idx="2"/>
+          </p:nvPr>
+        </p:nvSpPr>
+        <p:spPr/>
+      </p:sp>
+      <p:pic>
+        <p:nvPicPr>
+          <p:cNvPr id="3" name="Grafik 2">
+            <a:extLst>
+              <a:ext uri="{FF2B5EF4-FFF2-40B4-BE49-F238E27FC236}">
+                <a16:creationId xmlns:a16="http://schemas.microsoft.com/office/drawing/2014/main" id="{70A224B1-5920-07EC-FA06-27D6A1FAFB9F}"/>
+              </a:ext>
+            </a:extLst>
+          </p:cNvPr>
+          <p:cNvPicPr>
+            <a:picLocks noChangeAspect="1"/>
+          </p:cNvPicPr>
+          <p:nvPr/>
+        </p:nvPicPr>
+        <p:blipFill>
+          <a:blip r:embed="rId3"/>
+          <a:stretch>
+            <a:fillRect/>
+          </a:stretch>
+        </p:blipFill>
+        <p:spPr>
+          <a:xfrm>
+            <a:off x="3771526" y="1248122"/>
+            <a:ext cx="1493891" cy="4887157"/>
+          </a:xfrm>
+          <a:prstGeom prst="rect">
+            <a:avLst/>
+          </a:prstGeom>
+        </p:spPr>
+      </p:pic>
+    </p:spTree>
+    <p:extLst>
+      <p:ext uri="{BB962C8B-B14F-4D97-AF65-F5344CB8AC3E}">
+        <p14:creationId xmlns:p14="http://schemas.microsoft.com/office/powerpoint/2010/main" val="804986558"/>
+      </p:ext>
+    </p:extLst>
+  </p:cSld>
+  <p:clrMapOvr>
+    <a:masterClrMapping/>
+  </p:clrMapOvr>
+</p:sld>
+</file>
+
+<file path=ppt/slides/slide6.xml><?xml version="1.0" encoding="utf-8"?>
+<p:sld xmlns:a="http://schemas.openxmlformats.org/drawingml/2006/main" xmlns:r="http://schemas.openxmlformats.org/officeDocument/2006/relationships" xmlns:p="http://schemas.openxmlformats.org/presentationml/2006/main">
+  <p:cSld>
+    <p:spTree>
+      <p:nvGrpSpPr>
+        <p:cNvPr id="1" name="Shape 160"/>
+        <p:cNvGrpSpPr/>
+        <p:nvPr/>
+      </p:nvGrpSpPr>
+      <p:grpSpPr>
+        <a:xfrm>
+          <a:off x="0" y="0"/>
+          <a:ext cx="0" cy="0"/>
+          <a:chOff x="0" y="0"/>
+          <a:chExt cx="0" cy="0"/>
+        </a:xfrm>
+      </p:grpSpPr>
+      <p:sp>
+        <p:nvSpPr>
+          <p:cNvPr id="162" name="Google Shape;162;g71d64f1754_0_34"/>
+          <p:cNvSpPr txBox="1">
+            <a:spLocks noGrp="1"/>
+          </p:cNvSpPr>
+          <p:nvPr>
+            <p:ph type="title"/>
+          </p:nvPr>
+        </p:nvSpPr>
+        <p:spPr>
+          <a:xfrm>
+            <a:off x="549322" y="651700"/>
+            <a:ext cx="7938300" cy="938700"/>
+          </a:xfrm>
+          <a:prstGeom prst="rect">
+            <a:avLst/>
+          </a:prstGeom>
+        </p:spPr>
+        <p:txBody>
+          <a:bodyPr spcFirstLastPara="1" wrap="square" lIns="91425" tIns="45700" rIns="91425" bIns="45700" anchor="t" anchorCtr="0">
+            <a:noAutofit/>
+          </a:bodyPr>
+          <a:lstStyle/>
+          <a:p>
+            <a:pPr marL="0" lvl="0" indent="0" algn="l" rtl="0">
+              <a:spcBef>
+                <a:spcPts val="0"/>
+              </a:spcBef>
+              <a:spcAft>
+                <a:spcPts val="0"/>
+              </a:spcAft>
+              <a:buNone/>
+            </a:pPr>
+            <a:r>
+              <a:rPr lang="en-US" dirty="0"/>
+              <a:t>Client - UML</a:t>
+            </a:r>
+          </a:p>
+        </p:txBody>
+      </p:sp>
+      <p:sp>
+        <p:nvSpPr>
+          <p:cNvPr id="164" name="Google Shape;164;g71d64f1754_0_34"/>
+          <p:cNvSpPr txBox="1">
+            <a:spLocks noGrp="1"/>
+          </p:cNvSpPr>
+          <p:nvPr>
+            <p:ph type="sldNum" idx="12"/>
+          </p:nvPr>
+        </p:nvSpPr>
+        <p:spPr>
+          <a:xfrm>
+            <a:off x="8087836" y="6395540"/>
+            <a:ext cx="514500" cy="365100"/>
+          </a:xfrm>
+          <a:prstGeom prst="rect">
+            <a:avLst/>
+          </a:prstGeom>
+        </p:spPr>
+        <p:txBody>
+          <a:bodyPr spcFirstLastPara="1" wrap="square" lIns="91425" tIns="45700" rIns="91425" bIns="45700" anchor="ctr" anchorCtr="0">
+            <a:noAutofit/>
+          </a:bodyPr>
+          <a:lstStyle/>
+          <a:p>
+            <a:pPr marL="0" lvl="0" indent="0" algn="r" rtl="0">
+              <a:spcBef>
+                <a:spcPts val="0"/>
+              </a:spcBef>
+              <a:spcAft>
+                <a:spcPts val="0"/>
+              </a:spcAft>
+              <a:buNone/>
+            </a:pPr>
+            <a:fld id="{00000000-1234-1234-1234-123412341234}" type="slidenum">
+              <a:rPr lang="de-AT"/>
+              <a:t>6</a:t>
+            </a:fld>
+            <a:endParaRPr/>
+          </a:p>
+        </p:txBody>
+      </p:sp>
+      <p:sp>
+        <p:nvSpPr>
+          <p:cNvPr id="5" name="Bildplatzhalter 4">
+            <a:extLst>
+              <a:ext uri="{FF2B5EF4-FFF2-40B4-BE49-F238E27FC236}">
+                <a16:creationId xmlns:a16="http://schemas.microsoft.com/office/drawing/2014/main" id="{F8E179B0-ACF9-BE91-CB9D-15CD76B477F7}"/>
+              </a:ext>
+            </a:extLst>
+          </p:cNvPr>
+          <p:cNvSpPr>
+            <a:spLocks noGrp="1"/>
+          </p:cNvSpPr>
+          <p:nvPr>
+            <p:ph type="pic" idx="2"/>
+          </p:nvPr>
+        </p:nvSpPr>
+        <p:spPr/>
+      </p:sp>
+      <p:pic>
+        <p:nvPicPr>
+          <p:cNvPr id="7" name="Grafik 6">
+            <a:extLst>
+              <a:ext uri="{FF2B5EF4-FFF2-40B4-BE49-F238E27FC236}">
+                <a16:creationId xmlns:a16="http://schemas.microsoft.com/office/drawing/2014/main" id="{CF21F938-0436-CB4B-EF80-B7E295E0C3D0}"/>
+              </a:ext>
+            </a:extLst>
+          </p:cNvPr>
+          <p:cNvPicPr>
+            <a:picLocks noChangeAspect="1"/>
+          </p:cNvPicPr>
+          <p:nvPr/>
+        </p:nvPicPr>
+        <p:blipFill>
+          <a:blip r:embed="rId3"/>
+          <a:stretch>
+            <a:fillRect/>
+          </a:stretch>
+        </p:blipFill>
+        <p:spPr>
+          <a:xfrm>
+            <a:off x="2510560" y="1198484"/>
+            <a:ext cx="4060100" cy="5007815"/>
+          </a:xfrm>
+          <a:prstGeom prst="rect">
+            <a:avLst/>
+          </a:prstGeom>
+        </p:spPr>
+      </p:pic>
+    </p:spTree>
+    <p:extLst>
+      <p:ext uri="{BB962C8B-B14F-4D97-AF65-F5344CB8AC3E}">
+        <p14:creationId xmlns:p14="http://schemas.microsoft.com/office/powerpoint/2010/main" val="3473030381"/>
+      </p:ext>
+    </p:extLst>
+  </p:cSld>
+  <p:clrMapOvr>
+    <a:masterClrMapping/>
+  </p:clrMapOvr>
+</p:sld>
+</file>
+
+<file path=ppt/slides/slide7.xml><?xml version="1.0" encoding="utf-8"?>
 <p:sld xmlns:a="http://schemas.openxmlformats.org/drawingml/2006/main" xmlns:r="http://schemas.openxmlformats.org/officeDocument/2006/relationships" xmlns:p="http://schemas.openxmlformats.org/presentationml/2006/main">
   <p:cSld>
     <p:spTree>
@@ -23463,7 +25572,7 @@
             </a:pPr>
             <a:fld id="{00000000-1234-1234-1234-123412341234}" type="slidenum">
               <a:rPr lang="de-AT"/>
-              <a:t>3</a:t>
+              <a:t>7</a:t>
             </a:fld>
             <a:endParaRPr/>
           </a:p>
@@ -23540,7 +25649,7 @@
 </p:sld>
 </file>
 
-<file path=ppt/slides/slide4.xml><?xml version="1.0" encoding="utf-8"?>
+<file path=ppt/slides/slide8.xml><?xml version="1.0" encoding="utf-8"?>
 <p:sld xmlns:a="http://schemas.openxmlformats.org/drawingml/2006/main" xmlns:r="http://schemas.openxmlformats.org/officeDocument/2006/relationships" xmlns:p="http://schemas.openxmlformats.org/presentationml/2006/main">
   <p:cSld>
     <p:spTree>
@@ -23711,7 +25820,7 @@
             </a:pPr>
             <a:fld id="{00000000-1234-1234-1234-123412341234}" type="slidenum">
               <a:rPr lang="de-AT"/>
-              <a:t>4</a:t>
+              <a:t>8</a:t>
             </a:fld>
             <a:endParaRPr/>
           </a:p>
@@ -23804,7 +25913,7 @@
 </p:sld>
 </file>
 
-<file path=ppt/slides/slide5.xml><?xml version="1.0" encoding="utf-8"?>
+<file path=ppt/slides/slide9.xml><?xml version="1.0" encoding="utf-8"?>
 <p:sld xmlns:a="http://schemas.openxmlformats.org/drawingml/2006/main" xmlns:r="http://schemas.openxmlformats.org/officeDocument/2006/relationships" xmlns:p="http://schemas.openxmlformats.org/presentationml/2006/main">
   <p:cSld>
     <p:spTree>
@@ -23974,7 +26083,7 @@
             </a:pPr>
             <a:fld id="{00000000-1234-1234-1234-123412341234}" type="slidenum">
               <a:rPr lang="de-AT"/>
-              <a:t>5</a:t>
+              <a:t>9</a:t>
             </a:fld>
             <a:endParaRPr/>
           </a:p>
@@ -24063,760 +26172,6 @@
               <a:buNone/>
             </a:pPr>
             <a:endParaRPr lang="en-US" sz="2500" i="1" dirty="0"/>
-          </a:p>
-        </p:txBody>
-      </p:sp>
-    </p:spTree>
-  </p:cSld>
-  <p:clrMapOvr>
-    <a:masterClrMapping/>
-  </p:clrMapOvr>
-</p:sld>
-</file>
-
-<file path=ppt/slides/slide6.xml><?xml version="1.0" encoding="utf-8"?>
-<p:sld xmlns:a="http://schemas.openxmlformats.org/drawingml/2006/main" xmlns:r="http://schemas.openxmlformats.org/officeDocument/2006/relationships" xmlns:p="http://schemas.openxmlformats.org/presentationml/2006/main">
-  <p:cSld>
-    <p:spTree>
-      <p:nvGrpSpPr>
-        <p:cNvPr id="1" name="Shape 180"/>
-        <p:cNvGrpSpPr/>
-        <p:nvPr/>
-      </p:nvGrpSpPr>
-      <p:grpSpPr>
-        <a:xfrm>
-          <a:off x="0" y="0"/>
-          <a:ext cx="0" cy="0"/>
-          <a:chOff x="0" y="0"/>
-          <a:chExt cx="0" cy="0"/>
-        </a:xfrm>
-      </p:grpSpPr>
-      <p:sp>
-        <p:nvSpPr>
-          <p:cNvPr id="181" name="Google Shape;181;g71d64f1754_0_16"/>
-          <p:cNvSpPr txBox="1">
-            <a:spLocks noGrp="1"/>
-          </p:cNvSpPr>
-          <p:nvPr>
-            <p:ph type="body" idx="1"/>
-          </p:nvPr>
-        </p:nvSpPr>
-        <p:spPr>
-          <a:xfrm>
-            <a:off x="548268" y="5927411"/>
-            <a:ext cx="7925400" cy="278700"/>
-          </a:xfrm>
-          <a:prstGeom prst="rect">
-            <a:avLst/>
-          </a:prstGeom>
-        </p:spPr>
-        <p:txBody>
-          <a:bodyPr spcFirstLastPara="1" wrap="square" lIns="91425" tIns="45700" rIns="91425" bIns="45700" anchor="b" anchorCtr="0">
-            <a:noAutofit/>
-          </a:bodyPr>
-          <a:lstStyle/>
-          <a:p>
-            <a:pPr marL="0" lvl="0" indent="0" algn="l" rtl="0">
-              <a:spcBef>
-                <a:spcPts val="0"/>
-              </a:spcBef>
-              <a:spcAft>
-                <a:spcPts val="600"/>
-              </a:spcAft>
-              <a:buNone/>
-            </a:pPr>
-            <a:endParaRPr/>
-          </a:p>
-        </p:txBody>
-      </p:sp>
-      <p:sp>
-        <p:nvSpPr>
-          <p:cNvPr id="182" name="Google Shape;182;g71d64f1754_0_16"/>
-          <p:cNvSpPr txBox="1">
-            <a:spLocks noGrp="1"/>
-          </p:cNvSpPr>
-          <p:nvPr>
-            <p:ph type="title"/>
-          </p:nvPr>
-        </p:nvSpPr>
-        <p:spPr>
-          <a:xfrm>
-            <a:off x="549322" y="651700"/>
-            <a:ext cx="7938300" cy="938700"/>
-          </a:xfrm>
-          <a:prstGeom prst="rect">
-            <a:avLst/>
-          </a:prstGeom>
-        </p:spPr>
-        <p:txBody>
-          <a:bodyPr spcFirstLastPara="1" wrap="square" lIns="91425" tIns="45700" rIns="91425" bIns="45700" anchor="t" anchorCtr="0">
-            <a:noAutofit/>
-          </a:bodyPr>
-          <a:lstStyle/>
-          <a:p>
-            <a:pPr marL="0" lvl="0" indent="0" algn="l" rtl="0">
-              <a:spcBef>
-                <a:spcPts val="0"/>
-              </a:spcBef>
-              <a:spcAft>
-                <a:spcPts val="0"/>
-              </a:spcAft>
-              <a:buNone/>
-            </a:pPr>
-            <a:r>
-              <a:rPr lang="en-US" dirty="0"/>
-              <a:t>Task Distribution</a:t>
-            </a:r>
-          </a:p>
-        </p:txBody>
-      </p:sp>
-      <p:sp>
-        <p:nvSpPr>
-          <p:cNvPr id="183" name="Google Shape;183;g71d64f1754_0_16"/>
-          <p:cNvSpPr>
-            <a:spLocks noGrp="1"/>
-          </p:cNvSpPr>
-          <p:nvPr>
-            <p:ph type="pic" idx="2"/>
-          </p:nvPr>
-        </p:nvSpPr>
-        <p:spPr>
-          <a:xfrm>
-            <a:off x="1549400" y="6356350"/>
-            <a:ext cx="763200" cy="352800"/>
-          </a:xfrm>
-          <a:prstGeom prst="rect">
-            <a:avLst/>
-          </a:prstGeom>
-        </p:spPr>
-        <p:txBody>
-          <a:bodyPr spcFirstLastPara="1" wrap="square" lIns="36000" tIns="72000" rIns="91425" bIns="0" anchor="t" anchorCtr="0">
-            <a:noAutofit/>
-          </a:bodyPr>
-          <a:lstStyle/>
-          <a:p>
-            <a:pPr marL="0" lvl="0" indent="0" algn="l" rtl="0">
-              <a:spcBef>
-                <a:spcPts val="0"/>
-              </a:spcBef>
-              <a:spcAft>
-                <a:spcPts val="600"/>
-              </a:spcAft>
-              <a:buNone/>
-            </a:pPr>
-            <a:endParaRPr/>
-          </a:p>
-        </p:txBody>
-      </p:sp>
-      <p:sp>
-        <p:nvSpPr>
-          <p:cNvPr id="184" name="Google Shape;184;g71d64f1754_0_16"/>
-          <p:cNvSpPr txBox="1">
-            <a:spLocks noGrp="1"/>
-          </p:cNvSpPr>
-          <p:nvPr>
-            <p:ph type="sldNum" idx="12"/>
-          </p:nvPr>
-        </p:nvSpPr>
-        <p:spPr>
-          <a:xfrm>
-            <a:off x="8087836" y="6395540"/>
-            <a:ext cx="514500" cy="365100"/>
-          </a:xfrm>
-          <a:prstGeom prst="rect">
-            <a:avLst/>
-          </a:prstGeom>
-        </p:spPr>
-        <p:txBody>
-          <a:bodyPr spcFirstLastPara="1" wrap="square" lIns="91425" tIns="45700" rIns="91425" bIns="45700" anchor="ctr" anchorCtr="0">
-            <a:noAutofit/>
-          </a:bodyPr>
-          <a:lstStyle/>
-          <a:p>
-            <a:pPr marL="0" lvl="0" indent="0" algn="r" rtl="0">
-              <a:spcBef>
-                <a:spcPts val="0"/>
-              </a:spcBef>
-              <a:spcAft>
-                <a:spcPts val="0"/>
-              </a:spcAft>
-              <a:buNone/>
-            </a:pPr>
-            <a:fld id="{00000000-1234-1234-1234-123412341234}" type="slidenum">
-              <a:rPr lang="de-AT"/>
-              <a:t>6</a:t>
-            </a:fld>
-            <a:endParaRPr/>
-          </a:p>
-        </p:txBody>
-      </p:sp>
-      <p:sp>
-        <p:nvSpPr>
-          <p:cNvPr id="185" name="Google Shape;185;g71d64f1754_0_16"/>
-          <p:cNvSpPr txBox="1">
-            <a:spLocks noGrp="1"/>
-          </p:cNvSpPr>
-          <p:nvPr>
-            <p:ph type="body" idx="3"/>
-          </p:nvPr>
-        </p:nvSpPr>
-        <p:spPr>
-          <a:xfrm>
-            <a:off x="548268" y="1777395"/>
-            <a:ext cx="7925400" cy="4149900"/>
-          </a:xfrm>
-          <a:prstGeom prst="rect">
-            <a:avLst/>
-          </a:prstGeom>
-        </p:spPr>
-        <p:txBody>
-          <a:bodyPr spcFirstLastPara="1" wrap="square" lIns="91425" tIns="45700" rIns="91425" bIns="45700" anchor="t" anchorCtr="0">
-            <a:noAutofit/>
-          </a:bodyPr>
-          <a:lstStyle/>
-          <a:p>
-            <a:pPr marL="457200" lvl="0" indent="-387350" algn="l" rtl="0">
-              <a:spcBef>
-                <a:spcPts val="0"/>
-              </a:spcBef>
-              <a:spcAft>
-                <a:spcPts val="0"/>
-              </a:spcAft>
-              <a:buSzPts val="2500"/>
-              <a:buChar char="⬛"/>
-            </a:pPr>
-            <a:r>
-              <a:rPr lang="en-US" sz="2500" b="1" dirty="0"/>
-              <a:t>Mandatory: </a:t>
-            </a:r>
-            <a:r>
-              <a:rPr lang="en-US" sz="2500" i="1" dirty="0"/>
-              <a:t>Distribution of tasks</a:t>
-            </a:r>
-          </a:p>
-          <a:p>
-            <a:pPr lvl="1" indent="-387350">
-              <a:spcBef>
-                <a:spcPts val="0"/>
-              </a:spcBef>
-              <a:buSzPts val="2500"/>
-              <a:buChar char="⬛"/>
-            </a:pPr>
-            <a:r>
-              <a:rPr lang="en-US" sz="2300" i="1" dirty="0"/>
-              <a:t>Which person was working on which parts, and how much effort was put into these parts?</a:t>
-            </a:r>
-          </a:p>
-          <a:p>
-            <a:pPr lvl="1" indent="-387350">
-              <a:spcBef>
-                <a:spcPts val="0"/>
-              </a:spcBef>
-              <a:buSzPts val="2500"/>
-              <a:buChar char="⬛"/>
-            </a:pPr>
-            <a:r>
-              <a:rPr lang="en-US" sz="2300" i="1" dirty="0"/>
-              <a:t>This is your chance to show us that everyone is contributing to each part of the software (project requirement)</a:t>
-            </a:r>
-          </a:p>
-          <a:p>
-            <a:pPr marL="0" lvl="0" indent="0" algn="l" rtl="0">
-              <a:spcBef>
-                <a:spcPts val="600"/>
-              </a:spcBef>
-              <a:spcAft>
-                <a:spcPts val="0"/>
-              </a:spcAft>
-              <a:buNone/>
-            </a:pPr>
-            <a:endParaRPr lang="en-US" sz="2500" i="1" dirty="0"/>
-          </a:p>
-        </p:txBody>
-      </p:sp>
-    </p:spTree>
-    <p:extLst>
-      <p:ext uri="{BB962C8B-B14F-4D97-AF65-F5344CB8AC3E}">
-        <p14:creationId xmlns:p14="http://schemas.microsoft.com/office/powerpoint/2010/main" val="686943970"/>
-      </p:ext>
-    </p:extLst>
-  </p:cSld>
-  <p:clrMapOvr>
-    <a:masterClrMapping/>
-  </p:clrMapOvr>
-</p:sld>
-</file>
-
-<file path=ppt/slides/slide7.xml><?xml version="1.0" encoding="utf-8"?>
-<p:sld xmlns:a="http://schemas.openxmlformats.org/drawingml/2006/main" xmlns:r="http://schemas.openxmlformats.org/officeDocument/2006/relationships" xmlns:p="http://schemas.openxmlformats.org/presentationml/2006/main">
-  <p:cSld>
-    <p:spTree>
-      <p:nvGrpSpPr>
-        <p:cNvPr id="1" name="Shape 190"/>
-        <p:cNvGrpSpPr/>
-        <p:nvPr/>
-      </p:nvGrpSpPr>
-      <p:grpSpPr>
-        <a:xfrm>
-          <a:off x="0" y="0"/>
-          <a:ext cx="0" cy="0"/>
-          <a:chOff x="0" y="0"/>
-          <a:chExt cx="0" cy="0"/>
-        </a:xfrm>
-      </p:grpSpPr>
-      <p:sp>
-        <p:nvSpPr>
-          <p:cNvPr id="191" name="Google Shape;191;g71d64f1754_0_25"/>
-          <p:cNvSpPr txBox="1">
-            <a:spLocks noGrp="1"/>
-          </p:cNvSpPr>
-          <p:nvPr>
-            <p:ph type="body" idx="1"/>
-          </p:nvPr>
-        </p:nvSpPr>
-        <p:spPr>
-          <a:xfrm>
-            <a:off x="548268" y="5927411"/>
-            <a:ext cx="7925400" cy="278700"/>
-          </a:xfrm>
-          <a:prstGeom prst="rect">
-            <a:avLst/>
-          </a:prstGeom>
-        </p:spPr>
-        <p:txBody>
-          <a:bodyPr spcFirstLastPara="1" wrap="square" lIns="91425" tIns="45700" rIns="91425" bIns="45700" anchor="b" anchorCtr="0">
-            <a:noAutofit/>
-          </a:bodyPr>
-          <a:lstStyle/>
-          <a:p>
-            <a:pPr marL="0" lvl="0" indent="0" algn="l" rtl="0">
-              <a:spcBef>
-                <a:spcPts val="0"/>
-              </a:spcBef>
-              <a:spcAft>
-                <a:spcPts val="600"/>
-              </a:spcAft>
-              <a:buNone/>
-            </a:pPr>
-            <a:endParaRPr/>
-          </a:p>
-        </p:txBody>
-      </p:sp>
-      <p:sp>
-        <p:nvSpPr>
-          <p:cNvPr id="192" name="Google Shape;192;g71d64f1754_0_25"/>
-          <p:cNvSpPr txBox="1">
-            <a:spLocks noGrp="1"/>
-          </p:cNvSpPr>
-          <p:nvPr>
-            <p:ph type="title"/>
-          </p:nvPr>
-        </p:nvSpPr>
-        <p:spPr>
-          <a:xfrm>
-            <a:off x="549322" y="651700"/>
-            <a:ext cx="7938300" cy="938700"/>
-          </a:xfrm>
-          <a:prstGeom prst="rect">
-            <a:avLst/>
-          </a:prstGeom>
-        </p:spPr>
-        <p:txBody>
-          <a:bodyPr spcFirstLastPara="1" wrap="square" lIns="91425" tIns="45700" rIns="91425" bIns="45700" anchor="t" anchorCtr="0">
-            <a:noAutofit/>
-          </a:bodyPr>
-          <a:lstStyle/>
-          <a:p>
-            <a:pPr marL="0" lvl="0" indent="0" algn="l" rtl="0">
-              <a:spcBef>
-                <a:spcPts val="0"/>
-              </a:spcBef>
-              <a:spcAft>
-                <a:spcPts val="0"/>
-              </a:spcAft>
-              <a:buNone/>
-            </a:pPr>
-            <a:r>
-              <a:rPr lang="en-US" dirty="0"/>
-              <a:t>Problems in Release 2</a:t>
-            </a:r>
-          </a:p>
-        </p:txBody>
-      </p:sp>
-      <p:sp>
-        <p:nvSpPr>
-          <p:cNvPr id="193" name="Google Shape;193;g71d64f1754_0_25"/>
-          <p:cNvSpPr>
-            <a:spLocks noGrp="1"/>
-          </p:cNvSpPr>
-          <p:nvPr>
-            <p:ph type="pic" idx="2"/>
-          </p:nvPr>
-        </p:nvSpPr>
-        <p:spPr>
-          <a:xfrm>
-            <a:off x="1549400" y="6356350"/>
-            <a:ext cx="763200" cy="352800"/>
-          </a:xfrm>
-          <a:prstGeom prst="rect">
-            <a:avLst/>
-          </a:prstGeom>
-        </p:spPr>
-        <p:txBody>
-          <a:bodyPr spcFirstLastPara="1" wrap="square" lIns="36000" tIns="72000" rIns="91425" bIns="0" anchor="t" anchorCtr="0">
-            <a:noAutofit/>
-          </a:bodyPr>
-          <a:lstStyle/>
-          <a:p>
-            <a:pPr marL="0" lvl="0" indent="0" algn="l" rtl="0">
-              <a:spcBef>
-                <a:spcPts val="0"/>
-              </a:spcBef>
-              <a:spcAft>
-                <a:spcPts val="600"/>
-              </a:spcAft>
-              <a:buNone/>
-            </a:pPr>
-            <a:endParaRPr/>
-          </a:p>
-        </p:txBody>
-      </p:sp>
-      <p:sp>
-        <p:nvSpPr>
-          <p:cNvPr id="194" name="Google Shape;194;g71d64f1754_0_25"/>
-          <p:cNvSpPr txBox="1">
-            <a:spLocks noGrp="1"/>
-          </p:cNvSpPr>
-          <p:nvPr>
-            <p:ph type="sldNum" idx="12"/>
-          </p:nvPr>
-        </p:nvSpPr>
-        <p:spPr>
-          <a:xfrm>
-            <a:off x="8087836" y="6395540"/>
-            <a:ext cx="514500" cy="365100"/>
-          </a:xfrm>
-          <a:prstGeom prst="rect">
-            <a:avLst/>
-          </a:prstGeom>
-        </p:spPr>
-        <p:txBody>
-          <a:bodyPr spcFirstLastPara="1" wrap="square" lIns="91425" tIns="45700" rIns="91425" bIns="45700" anchor="ctr" anchorCtr="0">
-            <a:noAutofit/>
-          </a:bodyPr>
-          <a:lstStyle/>
-          <a:p>
-            <a:pPr marL="0" lvl="0" indent="0" algn="r" rtl="0">
-              <a:spcBef>
-                <a:spcPts val="0"/>
-              </a:spcBef>
-              <a:spcAft>
-                <a:spcPts val="0"/>
-              </a:spcAft>
-              <a:buNone/>
-            </a:pPr>
-            <a:fld id="{00000000-1234-1234-1234-123412341234}" type="slidenum">
-              <a:rPr lang="de-AT"/>
-              <a:t>7</a:t>
-            </a:fld>
-            <a:endParaRPr/>
-          </a:p>
-        </p:txBody>
-      </p:sp>
-      <p:sp>
-        <p:nvSpPr>
-          <p:cNvPr id="195" name="Google Shape;195;g71d64f1754_0_25"/>
-          <p:cNvSpPr txBox="1">
-            <a:spLocks noGrp="1"/>
-          </p:cNvSpPr>
-          <p:nvPr>
-            <p:ph type="body" idx="3"/>
-          </p:nvPr>
-        </p:nvSpPr>
-        <p:spPr>
-          <a:xfrm>
-            <a:off x="548268" y="1777395"/>
-            <a:ext cx="7925400" cy="4149900"/>
-          </a:xfrm>
-          <a:prstGeom prst="rect">
-            <a:avLst/>
-          </a:prstGeom>
-        </p:spPr>
-        <p:txBody>
-          <a:bodyPr spcFirstLastPara="1" wrap="square" lIns="91425" tIns="45700" rIns="91425" bIns="45700" anchor="t" anchorCtr="0">
-            <a:noAutofit/>
-          </a:bodyPr>
-          <a:lstStyle/>
-          <a:p>
-            <a:pPr marL="457200" lvl="0" indent="-387350" algn="l" rtl="0">
-              <a:spcBef>
-                <a:spcPts val="600"/>
-              </a:spcBef>
-              <a:spcAft>
-                <a:spcPts val="0"/>
-              </a:spcAft>
-              <a:buSzPts val="2500"/>
-              <a:buChar char="⬛"/>
-            </a:pPr>
-            <a:r>
-              <a:rPr lang="en-US" sz="2500" i="1" dirty="0"/>
-              <a:t>Description of major problems (Planning, Implementation, </a:t>
-            </a:r>
-            <a:r>
-              <a:rPr lang="en-US" sz="2500" i="1" dirty="0" err="1"/>
-              <a:t>etc</a:t>
-            </a:r>
-            <a:r>
-              <a:rPr lang="en-US" sz="2500" i="1" dirty="0"/>
-              <a:t>…)</a:t>
-            </a:r>
-          </a:p>
-          <a:p>
-            <a:pPr marL="457200" lvl="0" indent="-387350" algn="l" rtl="0">
-              <a:spcBef>
-                <a:spcPts val="0"/>
-              </a:spcBef>
-              <a:spcAft>
-                <a:spcPts val="0"/>
-              </a:spcAft>
-              <a:buSzPts val="2500"/>
-              <a:buChar char="⬛"/>
-            </a:pPr>
-            <a:r>
-              <a:rPr lang="en-US" sz="2500" i="1" dirty="0"/>
-              <a:t>What did the team learn? (Lessons learned to be applied for the next release)</a:t>
-            </a:r>
-          </a:p>
-        </p:txBody>
-      </p:sp>
-    </p:spTree>
-  </p:cSld>
-  <p:clrMapOvr>
-    <a:masterClrMapping/>
-  </p:clrMapOvr>
-</p:sld>
-</file>
-
-<file path=ppt/slides/slide8.xml><?xml version="1.0" encoding="utf-8"?>
-<p:sld xmlns:a="http://schemas.openxmlformats.org/drawingml/2006/main" xmlns:r="http://schemas.openxmlformats.org/officeDocument/2006/relationships" xmlns:p="http://schemas.openxmlformats.org/presentationml/2006/main">
-  <p:cSld>
-    <p:spTree>
-      <p:nvGrpSpPr>
-        <p:cNvPr id="1" name="Shape 200"/>
-        <p:cNvGrpSpPr/>
-        <p:nvPr/>
-      </p:nvGrpSpPr>
-      <p:grpSpPr>
-        <a:xfrm>
-          <a:off x="0" y="0"/>
-          <a:ext cx="0" cy="0"/>
-          <a:chOff x="0" y="0"/>
-          <a:chExt cx="0" cy="0"/>
-        </a:xfrm>
-      </p:grpSpPr>
-      <p:sp>
-        <p:nvSpPr>
-          <p:cNvPr id="201" name="Google Shape;201;g71d64f1754_0_52"/>
-          <p:cNvSpPr txBox="1">
-            <a:spLocks noGrp="1"/>
-          </p:cNvSpPr>
-          <p:nvPr>
-            <p:ph type="body" idx="1"/>
-          </p:nvPr>
-        </p:nvSpPr>
-        <p:spPr>
-          <a:xfrm>
-            <a:off x="548268" y="5927411"/>
-            <a:ext cx="7925400" cy="278700"/>
-          </a:xfrm>
-          <a:prstGeom prst="rect">
-            <a:avLst/>
-          </a:prstGeom>
-        </p:spPr>
-        <p:txBody>
-          <a:bodyPr spcFirstLastPara="1" wrap="square" lIns="91425" tIns="45700" rIns="91425" bIns="45700" anchor="b" anchorCtr="0">
-            <a:noAutofit/>
-          </a:bodyPr>
-          <a:lstStyle/>
-          <a:p>
-            <a:pPr marL="0" lvl="0" indent="0" algn="l" rtl="0">
-              <a:spcBef>
-                <a:spcPts val="0"/>
-              </a:spcBef>
-              <a:spcAft>
-                <a:spcPts val="600"/>
-              </a:spcAft>
-              <a:buNone/>
-            </a:pPr>
-            <a:endParaRPr/>
-          </a:p>
-        </p:txBody>
-      </p:sp>
-      <p:sp>
-        <p:nvSpPr>
-          <p:cNvPr id="202" name="Google Shape;202;g71d64f1754_0_52"/>
-          <p:cNvSpPr txBox="1">
-            <a:spLocks noGrp="1"/>
-          </p:cNvSpPr>
-          <p:nvPr>
-            <p:ph type="title"/>
-          </p:nvPr>
-        </p:nvSpPr>
-        <p:spPr>
-          <a:xfrm>
-            <a:off x="549325" y="651700"/>
-            <a:ext cx="8594700" cy="938700"/>
-          </a:xfrm>
-          <a:prstGeom prst="rect">
-            <a:avLst/>
-          </a:prstGeom>
-        </p:spPr>
-        <p:txBody>
-          <a:bodyPr spcFirstLastPara="1" wrap="square" lIns="91425" tIns="45700" rIns="91425" bIns="45700" anchor="t" anchorCtr="0">
-            <a:noAutofit/>
-          </a:bodyPr>
-          <a:lstStyle/>
-          <a:p>
-            <a:pPr marL="0" lvl="0" indent="0" algn="l" rtl="0">
-              <a:spcBef>
-                <a:spcPts val="0"/>
-              </a:spcBef>
-              <a:spcAft>
-                <a:spcPts val="0"/>
-              </a:spcAft>
-              <a:buNone/>
-            </a:pPr>
-            <a:r>
-              <a:rPr lang="en-US" dirty="0"/>
-              <a:t>Next Steps + Planning </a:t>
-            </a:r>
-            <a:r>
-              <a:rPr lang="en-US"/>
-              <a:t>Release 3</a:t>
-            </a:r>
-            <a:endParaRPr lang="en-US" dirty="0"/>
-          </a:p>
-        </p:txBody>
-      </p:sp>
-      <p:sp>
-        <p:nvSpPr>
-          <p:cNvPr id="203" name="Google Shape;203;g71d64f1754_0_52"/>
-          <p:cNvSpPr>
-            <a:spLocks noGrp="1"/>
-          </p:cNvSpPr>
-          <p:nvPr>
-            <p:ph type="pic" idx="2"/>
-          </p:nvPr>
-        </p:nvSpPr>
-        <p:spPr>
-          <a:xfrm>
-            <a:off x="1549400" y="6356350"/>
-            <a:ext cx="763200" cy="352800"/>
-          </a:xfrm>
-          <a:prstGeom prst="rect">
-            <a:avLst/>
-          </a:prstGeom>
-        </p:spPr>
-        <p:txBody>
-          <a:bodyPr spcFirstLastPara="1" wrap="square" lIns="36000" tIns="72000" rIns="91425" bIns="0" anchor="t" anchorCtr="0">
-            <a:noAutofit/>
-          </a:bodyPr>
-          <a:lstStyle/>
-          <a:p>
-            <a:pPr marL="0" lvl="0" indent="0" algn="l" rtl="0">
-              <a:spcBef>
-                <a:spcPts val="0"/>
-              </a:spcBef>
-              <a:spcAft>
-                <a:spcPts val="600"/>
-              </a:spcAft>
-              <a:buNone/>
-            </a:pPr>
-            <a:endParaRPr/>
-          </a:p>
-        </p:txBody>
-      </p:sp>
-      <p:sp>
-        <p:nvSpPr>
-          <p:cNvPr id="204" name="Google Shape;204;g71d64f1754_0_52"/>
-          <p:cNvSpPr txBox="1">
-            <a:spLocks noGrp="1"/>
-          </p:cNvSpPr>
-          <p:nvPr>
-            <p:ph type="sldNum" idx="12"/>
-          </p:nvPr>
-        </p:nvSpPr>
-        <p:spPr>
-          <a:xfrm>
-            <a:off x="8087836" y="6395540"/>
-            <a:ext cx="514500" cy="365100"/>
-          </a:xfrm>
-          <a:prstGeom prst="rect">
-            <a:avLst/>
-          </a:prstGeom>
-        </p:spPr>
-        <p:txBody>
-          <a:bodyPr spcFirstLastPara="1" wrap="square" lIns="91425" tIns="45700" rIns="91425" bIns="45700" anchor="ctr" anchorCtr="0">
-            <a:noAutofit/>
-          </a:bodyPr>
-          <a:lstStyle/>
-          <a:p>
-            <a:pPr marL="0" lvl="0" indent="0" algn="r" rtl="0">
-              <a:spcBef>
-                <a:spcPts val="0"/>
-              </a:spcBef>
-              <a:spcAft>
-                <a:spcPts val="0"/>
-              </a:spcAft>
-              <a:buNone/>
-            </a:pPr>
-            <a:fld id="{00000000-1234-1234-1234-123412341234}" type="slidenum">
-              <a:rPr lang="de-AT"/>
-              <a:t>8</a:t>
-            </a:fld>
-            <a:endParaRPr/>
-          </a:p>
-        </p:txBody>
-      </p:sp>
-      <p:sp>
-        <p:nvSpPr>
-          <p:cNvPr id="205" name="Google Shape;205;g71d64f1754_0_52"/>
-          <p:cNvSpPr txBox="1">
-            <a:spLocks noGrp="1"/>
-          </p:cNvSpPr>
-          <p:nvPr>
-            <p:ph type="body" idx="3"/>
-          </p:nvPr>
-        </p:nvSpPr>
-        <p:spPr>
-          <a:xfrm>
-            <a:off x="548268" y="1777395"/>
-            <a:ext cx="7925400" cy="4149900"/>
-          </a:xfrm>
-          <a:prstGeom prst="rect">
-            <a:avLst/>
-          </a:prstGeom>
-        </p:spPr>
-        <p:txBody>
-          <a:bodyPr spcFirstLastPara="1" wrap="square" lIns="91425" tIns="45700" rIns="91425" bIns="45700" anchor="t" anchorCtr="0">
-            <a:noAutofit/>
-          </a:bodyPr>
-          <a:lstStyle/>
-          <a:p>
-            <a:pPr marL="457200" lvl="0" indent="-387350" algn="l" rtl="0">
-              <a:spcBef>
-                <a:spcPts val="600"/>
-              </a:spcBef>
-              <a:spcAft>
-                <a:spcPts val="0"/>
-              </a:spcAft>
-              <a:buSzPts val="2500"/>
-              <a:buChar char="⬛"/>
-            </a:pPr>
-            <a:r>
-              <a:rPr lang="en-US" sz="2500" i="1" dirty="0"/>
-              <a:t>Brief overview of the further plan and next steps</a:t>
-            </a:r>
           </a:p>
         </p:txBody>
       </p:sp>

</xml_diff>